<commit_message>
Update presentation big time.
</commit_message>
<xml_diff>
--- a/project_presentation.pptx
+++ b/project_presentation.pptx
@@ -7,24 +7,27 @@
   <p:sldIdLst>
     <p:sldId id="256" r:id="rId2"/>
     <p:sldId id="270" r:id="rId3"/>
-    <p:sldId id="257" r:id="rId4"/>
-    <p:sldId id="258" r:id="rId5"/>
-    <p:sldId id="259" r:id="rId6"/>
-    <p:sldId id="260" r:id="rId7"/>
-    <p:sldId id="261" r:id="rId8"/>
-    <p:sldId id="262" r:id="rId9"/>
-    <p:sldId id="263" r:id="rId10"/>
-    <p:sldId id="264" r:id="rId11"/>
-    <p:sldId id="265" r:id="rId12"/>
-    <p:sldId id="266" r:id="rId13"/>
-    <p:sldId id="267" r:id="rId14"/>
-    <p:sldId id="271" r:id="rId15"/>
-    <p:sldId id="273" r:id="rId16"/>
-    <p:sldId id="274" r:id="rId17"/>
-    <p:sldId id="268" r:id="rId18"/>
-    <p:sldId id="272" r:id="rId19"/>
-    <p:sldId id="269" r:id="rId20"/>
-    <p:sldId id="275" r:id="rId21"/>
+    <p:sldId id="276" r:id="rId4"/>
+    <p:sldId id="257" r:id="rId5"/>
+    <p:sldId id="258" r:id="rId6"/>
+    <p:sldId id="259" r:id="rId7"/>
+    <p:sldId id="260" r:id="rId8"/>
+    <p:sldId id="261" r:id="rId9"/>
+    <p:sldId id="262" r:id="rId10"/>
+    <p:sldId id="263" r:id="rId11"/>
+    <p:sldId id="264" r:id="rId12"/>
+    <p:sldId id="265" r:id="rId13"/>
+    <p:sldId id="277" r:id="rId14"/>
+    <p:sldId id="266" r:id="rId15"/>
+    <p:sldId id="267" r:id="rId16"/>
+    <p:sldId id="271" r:id="rId17"/>
+    <p:sldId id="273" r:id="rId18"/>
+    <p:sldId id="274" r:id="rId19"/>
+    <p:sldId id="268" r:id="rId20"/>
+    <p:sldId id="272" r:id="rId21"/>
+    <p:sldId id="269" r:id="rId22"/>
+    <p:sldId id="275" r:id="rId23"/>
+    <p:sldId id="278" r:id="rId24"/>
   </p:sldIdLst>
   <p:sldSz cx="9144000" cy="6858000" type="screen4x3"/>
   <p:notesSz cx="6858000" cy="9144000"/>
@@ -307,7 +310,7 @@
           <a:p>
             <a:fld id="{3F5F293D-20BF-487A-BFA7-792ABC73B8A5}" type="datetimeFigureOut">
               <a:rPr lang="th-TH" smtClean="0"/>
-              <a:t>24/12/63</a:t>
+              <a:t>26/12/63</a:t>
             </a:fld>
             <a:endParaRPr lang="th-TH"/>
           </a:p>
@@ -472,7 +475,7 @@
           <a:p>
             <a:fld id="{3F5F293D-20BF-487A-BFA7-792ABC73B8A5}" type="datetimeFigureOut">
               <a:rPr lang="th-TH" smtClean="0"/>
-              <a:t>24/12/63</a:t>
+              <a:t>26/12/63</a:t>
             </a:fld>
             <a:endParaRPr lang="th-TH"/>
           </a:p>
@@ -647,7 +650,7 @@
           <a:p>
             <a:fld id="{3F5F293D-20BF-487A-BFA7-792ABC73B8A5}" type="datetimeFigureOut">
               <a:rPr lang="th-TH" smtClean="0"/>
-              <a:t>24/12/63</a:t>
+              <a:t>26/12/63</a:t>
             </a:fld>
             <a:endParaRPr lang="th-TH"/>
           </a:p>
@@ -812,7 +815,7 @@
           <a:p>
             <a:fld id="{3F5F293D-20BF-487A-BFA7-792ABC73B8A5}" type="datetimeFigureOut">
               <a:rPr lang="th-TH" smtClean="0"/>
-              <a:t>24/12/63</a:t>
+              <a:t>26/12/63</a:t>
             </a:fld>
             <a:endParaRPr lang="th-TH"/>
           </a:p>
@@ -1053,7 +1056,7 @@
           <a:p>
             <a:fld id="{3F5F293D-20BF-487A-BFA7-792ABC73B8A5}" type="datetimeFigureOut">
               <a:rPr lang="th-TH" smtClean="0"/>
-              <a:t>24/12/63</a:t>
+              <a:t>26/12/63</a:t>
             </a:fld>
             <a:endParaRPr lang="th-TH"/>
           </a:p>
@@ -1336,7 +1339,7 @@
           <a:p>
             <a:fld id="{3F5F293D-20BF-487A-BFA7-792ABC73B8A5}" type="datetimeFigureOut">
               <a:rPr lang="th-TH" smtClean="0"/>
-              <a:t>24/12/63</a:t>
+              <a:t>26/12/63</a:t>
             </a:fld>
             <a:endParaRPr lang="th-TH"/>
           </a:p>
@@ -1753,7 +1756,7 @@
           <a:p>
             <a:fld id="{3F5F293D-20BF-487A-BFA7-792ABC73B8A5}" type="datetimeFigureOut">
               <a:rPr lang="th-TH" smtClean="0"/>
-              <a:t>24/12/63</a:t>
+              <a:t>26/12/63</a:t>
             </a:fld>
             <a:endParaRPr lang="th-TH"/>
           </a:p>
@@ -1866,7 +1869,7 @@
           <a:p>
             <a:fld id="{3F5F293D-20BF-487A-BFA7-792ABC73B8A5}" type="datetimeFigureOut">
               <a:rPr lang="th-TH" smtClean="0"/>
-              <a:t>24/12/63</a:t>
+              <a:t>26/12/63</a:t>
             </a:fld>
             <a:endParaRPr lang="th-TH"/>
           </a:p>
@@ -1956,7 +1959,7 @@
           <a:p>
             <a:fld id="{3F5F293D-20BF-487A-BFA7-792ABC73B8A5}" type="datetimeFigureOut">
               <a:rPr lang="th-TH" smtClean="0"/>
-              <a:t>24/12/63</a:t>
+              <a:t>26/12/63</a:t>
             </a:fld>
             <a:endParaRPr lang="th-TH"/>
           </a:p>
@@ -2228,7 +2231,7 @@
           <a:p>
             <a:fld id="{3F5F293D-20BF-487A-BFA7-792ABC73B8A5}" type="datetimeFigureOut">
               <a:rPr lang="th-TH" smtClean="0"/>
-              <a:t>24/12/63</a:t>
+              <a:t>26/12/63</a:t>
             </a:fld>
             <a:endParaRPr lang="th-TH"/>
           </a:p>
@@ -2476,7 +2479,7 @@
           <a:p>
             <a:fld id="{3F5F293D-20BF-487A-BFA7-792ABC73B8A5}" type="datetimeFigureOut">
               <a:rPr lang="th-TH" smtClean="0"/>
-              <a:t>24/12/63</a:t>
+              <a:t>26/12/63</a:t>
             </a:fld>
             <a:endParaRPr lang="th-TH"/>
           </a:p>
@@ -2684,7 +2687,7 @@
           <a:p>
             <a:fld id="{3F5F293D-20BF-487A-BFA7-792ABC73B8A5}" type="datetimeFigureOut">
               <a:rPr lang="th-TH" smtClean="0"/>
-              <a:t>24/12/63</a:t>
+              <a:t>26/12/63</a:t>
             </a:fld>
             <a:endParaRPr lang="th-TH"/>
           </a:p>
@@ -3147,7 +3150,7 @@
           <a:p>
             <a:r>
               <a:rPr lang="en-US" dirty="0" smtClean="0"/>
-              <a:t>Stage 8</a:t>
+              <a:t>Stage 7</a:t>
             </a:r>
             <a:endParaRPr lang="th-TH" dirty="0"/>
           </a:p>
@@ -3168,13 +3171,55 @@
           <a:bodyPr/>
           <a:lstStyle/>
           <a:p>
-            <a:endParaRPr lang="th-TH"/>
+            <a:r>
+              <a:rPr lang="en-US" dirty="0" smtClean="0"/>
+              <a:t>1 </a:t>
+            </a:r>
+            <a:r>
+              <a:rPr lang="en-US" dirty="0"/>
+              <a:t>scheduling </a:t>
+            </a:r>
+            <a:r>
+              <a:rPr lang="en-US" dirty="0" smtClean="0"/>
+              <a:t>command </a:t>
+            </a:r>
+            <a:r>
+              <a:rPr lang="en-US" dirty="0"/>
+              <a:t>executed, </a:t>
+            </a:r>
+            <a:r>
+              <a:rPr lang="en-US" dirty="0" smtClean="0"/>
+              <a:t>it is to </a:t>
+            </a:r>
+            <a:r>
+              <a:rPr lang="en-US" dirty="0"/>
+              <a:t>turn </a:t>
+            </a:r>
+            <a:r>
+              <a:rPr lang="en-US" dirty="0" smtClean="0"/>
+              <a:t>off </a:t>
+            </a:r>
+            <a:r>
+              <a:rPr lang="en-US" dirty="0"/>
+              <a:t>the bathroom water at </a:t>
+            </a:r>
+            <a:r>
+              <a:rPr lang="en-US" dirty="0" smtClean="0"/>
+              <a:t>8:00 AM</a:t>
+            </a:r>
+          </a:p>
+          <a:p>
+            <a:r>
+              <a:rPr lang="en-US" dirty="0" smtClean="0"/>
+              <a:t>Now 6:00 AM, the bedroom light has been turned on by a scheduled command.</a:t>
+            </a:r>
+            <a:endParaRPr lang="th-TH" dirty="0"/>
           </a:p>
         </p:txBody>
       </p:sp>
       <p:pic>
         <p:nvPicPr>
-          <p:cNvPr id="8194" name="Picture 2"/>
+          <p:cNvPr id="7170" name="Picture 2"/>
           <p:cNvPicPr>
             <a:picLocks noChangeAspect="1" noChangeArrowheads="1"/>
           </p:cNvPicPr>
@@ -3195,8 +3240,8 @@
         </p:blipFill>
         <p:spPr bwMode="auto">
           <a:xfrm>
-            <a:off x="1833563" y="2492896"/>
-            <a:ext cx="5476875" cy="1514475"/>
+            <a:off x="827583" y="4077072"/>
+            <a:ext cx="7172325" cy="1809750"/>
           </a:xfrm>
           <a:prstGeom prst="rect">
             <a:avLst/>
@@ -3229,7 +3274,7 @@
     </p:spTree>
     <p:extLst>
       <p:ext uri="{BB962C8B-B14F-4D97-AF65-F5344CB8AC3E}">
-        <p14:creationId xmlns:p14="http://schemas.microsoft.com/office/powerpoint/2010/main" val="3860284165"/>
+        <p14:creationId xmlns:p14="http://schemas.microsoft.com/office/powerpoint/2010/main" val="741119570"/>
       </p:ext>
     </p:extLst>
   </p:cSld>
@@ -3273,7 +3318,7 @@
           <a:p>
             <a:r>
               <a:rPr lang="en-US" dirty="0" smtClean="0"/>
-              <a:t>Stage 9</a:t>
+              <a:t>Stage 8</a:t>
             </a:r>
             <a:endParaRPr lang="th-TH" dirty="0"/>
           </a:p>
@@ -3294,13 +3339,23 @@
           <a:bodyPr/>
           <a:lstStyle/>
           <a:p>
-            <a:endParaRPr lang="th-TH"/>
+            <a:r>
+              <a:rPr lang="en-US" dirty="0" smtClean="0"/>
+              <a:t>No commands executed.</a:t>
+            </a:r>
+          </a:p>
+          <a:p>
+            <a:r>
+              <a:rPr lang="en-US" dirty="0" smtClean="0"/>
+              <a:t>Now 7:00 AM, both the bathroom’s light and water are turned on due to previous scheduled commands.</a:t>
+            </a:r>
+            <a:endParaRPr lang="th-TH" dirty="0"/>
           </a:p>
         </p:txBody>
       </p:sp>
       <p:pic>
         <p:nvPicPr>
-          <p:cNvPr id="9218" name="Picture 2"/>
+          <p:cNvPr id="8194" name="Picture 2"/>
           <p:cNvPicPr>
             <a:picLocks noChangeAspect="1" noChangeArrowheads="1"/>
           </p:cNvPicPr>
@@ -3321,8 +3376,8 @@
         </p:blipFill>
         <p:spPr bwMode="auto">
           <a:xfrm>
-            <a:off x="1762125" y="2492896"/>
-            <a:ext cx="5619750" cy="1524000"/>
+            <a:off x="1691680" y="4007371"/>
+            <a:ext cx="5476875" cy="1514475"/>
           </a:xfrm>
           <a:prstGeom prst="rect">
             <a:avLst/>
@@ -3355,7 +3410,7 @@
     </p:spTree>
     <p:extLst>
       <p:ext uri="{BB962C8B-B14F-4D97-AF65-F5344CB8AC3E}">
-        <p14:creationId xmlns:p14="http://schemas.microsoft.com/office/powerpoint/2010/main" val="1979437897"/>
+        <p14:creationId xmlns:p14="http://schemas.microsoft.com/office/powerpoint/2010/main" val="3860284165"/>
       </p:ext>
     </p:extLst>
   </p:cSld>
@@ -3399,7 +3454,7 @@
           <a:p>
             <a:r>
               <a:rPr lang="en-US" dirty="0" smtClean="0"/>
-              <a:t>Code : Global</a:t>
+              <a:t>Stage 9</a:t>
             </a:r>
             <a:endParaRPr lang="th-TH" dirty="0"/>
           </a:p>
@@ -3420,13 +3475,23 @@
           <a:bodyPr/>
           <a:lstStyle/>
           <a:p>
-            <a:endParaRPr lang="th-TH"/>
+            <a:r>
+              <a:rPr lang="en-US" dirty="0" smtClean="0"/>
+              <a:t>No commands executed.</a:t>
+            </a:r>
+          </a:p>
+          <a:p>
+            <a:r>
+              <a:rPr lang="en-US" dirty="0" smtClean="0"/>
+              <a:t>Now 8:00 AM, the bathroom water is now turned off, but the kitchen water is now on, both by scheduled commands.</a:t>
+            </a:r>
+            <a:endParaRPr lang="th-TH" dirty="0"/>
           </a:p>
         </p:txBody>
       </p:sp>
       <p:pic>
         <p:nvPicPr>
-          <p:cNvPr id="10242" name="Picture 2"/>
+          <p:cNvPr id="9218" name="Picture 2"/>
           <p:cNvPicPr>
             <a:picLocks noChangeAspect="1" noChangeArrowheads="1"/>
           </p:cNvPicPr>
@@ -3447,8 +3512,8 @@
         </p:blipFill>
         <p:spPr bwMode="auto">
           <a:xfrm>
-            <a:off x="1763688" y="1628799"/>
-            <a:ext cx="5233385" cy="4826521"/>
+            <a:off x="1774896" y="4052099"/>
+            <a:ext cx="5619750" cy="1524000"/>
           </a:xfrm>
           <a:prstGeom prst="rect">
             <a:avLst/>
@@ -3481,7 +3546,7 @@
     </p:spTree>
     <p:extLst>
       <p:ext uri="{BB962C8B-B14F-4D97-AF65-F5344CB8AC3E}">
-        <p14:creationId xmlns:p14="http://schemas.microsoft.com/office/powerpoint/2010/main" val="4284090306"/>
+        <p14:creationId xmlns:p14="http://schemas.microsoft.com/office/powerpoint/2010/main" val="1979437897"/>
       </p:ext>
     </p:extLst>
   </p:cSld>
@@ -3518,6 +3583,64 @@
             <p:ph type="title"/>
           </p:nvPr>
         </p:nvSpPr>
+        <p:spPr>
+          <a:xfrm>
+            <a:off x="431562" y="2325629"/>
+            <a:ext cx="8229600" cy="1143000"/>
+          </a:xfrm>
+        </p:spPr>
+        <p:txBody>
+          <a:bodyPr/>
+          <a:lstStyle/>
+          <a:p>
+            <a:r>
+              <a:rPr lang="en-US" dirty="0" smtClean="0"/>
+              <a:t>The codes behind the scene.</a:t>
+            </a:r>
+            <a:endParaRPr lang="th-TH" dirty="0"/>
+          </a:p>
+        </p:txBody>
+      </p:sp>
+    </p:spTree>
+    <p:extLst>
+      <p:ext uri="{BB962C8B-B14F-4D97-AF65-F5344CB8AC3E}">
+        <p14:creationId xmlns:p14="http://schemas.microsoft.com/office/powerpoint/2010/main" val="964680392"/>
+      </p:ext>
+    </p:extLst>
+  </p:cSld>
+  <p:clrMapOvr>
+    <a:masterClrMapping/>
+  </p:clrMapOvr>
+</p:sld>
+</file>
+
+<file path=ppt/slides/slide14.xml><?xml version="1.0" encoding="utf-8"?>
+<p:sld xmlns:a="http://schemas.openxmlformats.org/drawingml/2006/main" xmlns:r="http://schemas.openxmlformats.org/officeDocument/2006/relationships" xmlns:p="http://schemas.openxmlformats.org/presentationml/2006/main">
+  <p:cSld>
+    <p:spTree>
+      <p:nvGrpSpPr>
+        <p:cNvPr id="1" name=""/>
+        <p:cNvGrpSpPr/>
+        <p:nvPr/>
+      </p:nvGrpSpPr>
+      <p:grpSpPr>
+        <a:xfrm>
+          <a:off x="0" y="0"/>
+          <a:ext cx="0" cy="0"/>
+          <a:chOff x="0" y="0"/>
+          <a:chExt cx="0" cy="0"/>
+        </a:xfrm>
+      </p:grpSpPr>
+      <p:sp>
+        <p:nvSpPr>
+          <p:cNvPr id="2" name="ชื่อเรื่อง 1"/>
+          <p:cNvSpPr>
+            <a:spLocks noGrp="1"/>
+          </p:cNvSpPr>
+          <p:nvPr>
+            <p:ph type="title"/>
+          </p:nvPr>
+        </p:nvSpPr>
         <p:spPr/>
         <p:txBody>
           <a:bodyPr/>
@@ -3525,34 +3648,15 @@
           <a:p>
             <a:r>
               <a:rPr lang="en-US" dirty="0" smtClean="0"/>
-              <a:t>Code: House Class</a:t>
+              <a:t>Code : Global</a:t>
             </a:r>
             <a:endParaRPr lang="th-TH" dirty="0"/>
-          </a:p>
-        </p:txBody>
-      </p:sp>
-      <p:sp>
-        <p:nvSpPr>
-          <p:cNvPr id="3" name="ตัวแทนเนื้อหา 2"/>
-          <p:cNvSpPr>
-            <a:spLocks noGrp="1"/>
-          </p:cNvSpPr>
-          <p:nvPr>
-            <p:ph idx="1"/>
-          </p:nvPr>
-        </p:nvSpPr>
-        <p:spPr/>
-        <p:txBody>
-          <a:bodyPr/>
-          <a:lstStyle/>
-          <a:p>
-            <a:endParaRPr lang="th-TH"/>
           </a:p>
         </p:txBody>
       </p:sp>
       <p:pic>
         <p:nvPicPr>
-          <p:cNvPr id="4" name="Picture 2"/>
+          <p:cNvPr id="10242" name="Picture 2"/>
           <p:cNvPicPr>
             <a:picLocks noChangeAspect="1" noChangeArrowheads="1"/>
           </p:cNvPicPr>
@@ -3573,8 +3677,8 @@
         </p:blipFill>
         <p:spPr bwMode="auto">
           <a:xfrm>
-            <a:off x="623888" y="1714500"/>
-            <a:ext cx="7896225" cy="3429000"/>
+            <a:off x="1763688" y="1556792"/>
+            <a:ext cx="5233385" cy="4826521"/>
           </a:xfrm>
           <a:prstGeom prst="rect">
             <a:avLst/>
@@ -3604,10 +3708,102 @@
           </a:extLst>
         </p:spPr>
       </p:pic>
+      <p:sp>
+        <p:nvSpPr>
+          <p:cNvPr id="5" name="สี่เหลี่ยมผืนผ้า 4"/>
+          <p:cNvSpPr/>
+          <p:nvPr/>
+        </p:nvSpPr>
+        <p:spPr>
+          <a:xfrm>
+            <a:off x="1737372" y="1484784"/>
+            <a:ext cx="3122660" cy="396044"/>
+          </a:xfrm>
+          <a:prstGeom prst="rect">
+            <a:avLst/>
+          </a:prstGeom>
+          <a:noFill/>
+          <a:ln>
+            <a:solidFill>
+              <a:schemeClr val="tx1"/>
+            </a:solidFill>
+          </a:ln>
+        </p:spPr>
+        <p:style>
+          <a:lnRef idx="2">
+            <a:schemeClr val="accent1">
+              <a:shade val="50000"/>
+            </a:schemeClr>
+          </a:lnRef>
+          <a:fillRef idx="1">
+            <a:schemeClr val="accent1"/>
+          </a:fillRef>
+          <a:effectRef idx="0">
+            <a:schemeClr val="accent1"/>
+          </a:effectRef>
+          <a:fontRef idx="minor">
+            <a:schemeClr val="lt1"/>
+          </a:fontRef>
+        </p:style>
+        <p:txBody>
+          <a:bodyPr rtlCol="0" anchor="ctr"/>
+          <a:lstStyle/>
+          <a:p>
+            <a:pPr algn="ctr"/>
+            <a:endParaRPr lang="th-TH"/>
+          </a:p>
+        </p:txBody>
+      </p:sp>
+      <p:sp>
+        <p:nvSpPr>
+          <p:cNvPr id="6" name="สี่เหลี่ยมผืนผ้า 5"/>
+          <p:cNvSpPr/>
+          <p:nvPr/>
+        </p:nvSpPr>
+        <p:spPr>
+          <a:xfrm>
+            <a:off x="1763688" y="1988839"/>
+            <a:ext cx="4896544" cy="4394473"/>
+          </a:xfrm>
+          <a:prstGeom prst="rect">
+            <a:avLst/>
+          </a:prstGeom>
+          <a:noFill/>
+          <a:ln>
+            <a:solidFill>
+              <a:schemeClr val="tx1"/>
+            </a:solidFill>
+          </a:ln>
+        </p:spPr>
+        <p:style>
+          <a:lnRef idx="2">
+            <a:schemeClr val="accent1">
+              <a:shade val="50000"/>
+            </a:schemeClr>
+          </a:lnRef>
+          <a:fillRef idx="1">
+            <a:schemeClr val="accent1"/>
+          </a:fillRef>
+          <a:effectRef idx="0">
+            <a:schemeClr val="accent1"/>
+          </a:effectRef>
+          <a:fontRef idx="minor">
+            <a:schemeClr val="lt1"/>
+          </a:fontRef>
+        </p:style>
+        <p:txBody>
+          <a:bodyPr rtlCol="0" anchor="ctr"/>
+          <a:lstStyle/>
+          <a:p>
+            <a:pPr algn="ctr"/>
+            <a:endParaRPr lang="th-TH"/>
+          </a:p>
+        </p:txBody>
+      </p:sp>
     </p:spTree>
     <p:extLst>
       <p:ext uri="{BB962C8B-B14F-4D97-AF65-F5344CB8AC3E}">
-        <p14:creationId xmlns:p14="http://schemas.microsoft.com/office/powerpoint/2010/main" val="2006713140"/>
+        <p14:creationId xmlns:p14="http://schemas.microsoft.com/office/powerpoint/2010/main" val="4284090306"/>
       </p:ext>
     </p:extLst>
   </p:cSld>
@@ -3617,7 +3813,7 @@
 </p:sld>
 </file>
 
-<file path=ppt/slides/slide14.xml><?xml version="1.0" encoding="utf-8"?>
+<file path=ppt/slides/slide15.xml><?xml version="1.0" encoding="utf-8"?>
 <p:sld xmlns:a="http://schemas.openxmlformats.org/drawingml/2006/main" xmlns:r="http://schemas.openxmlformats.org/officeDocument/2006/relationships" xmlns:p="http://schemas.openxmlformats.org/presentationml/2006/main">
   <p:cSld>
     <p:spTree>
@@ -3651,34 +3847,19 @@
           <a:p>
             <a:r>
               <a:rPr lang="en-US" dirty="0" smtClean="0"/>
-              <a:t>Code: House Class</a:t>
+              <a:t>Code: House </a:t>
+            </a:r>
+            <a:r>
+              <a:rPr lang="en-US" dirty="0" smtClean="0"/>
+              <a:t>Class (Part 1)</a:t>
             </a:r>
             <a:endParaRPr lang="th-TH" dirty="0"/>
-          </a:p>
-        </p:txBody>
-      </p:sp>
-      <p:sp>
-        <p:nvSpPr>
-          <p:cNvPr id="3" name="ตัวแทนเนื้อหา 2"/>
-          <p:cNvSpPr>
-            <a:spLocks noGrp="1"/>
-          </p:cNvSpPr>
-          <p:nvPr>
-            <p:ph idx="1"/>
-          </p:nvPr>
-        </p:nvSpPr>
-        <p:spPr/>
-        <p:txBody>
-          <a:bodyPr/>
-          <a:lstStyle/>
-          <a:p>
-            <a:endParaRPr lang="th-TH"/>
           </a:p>
         </p:txBody>
       </p:sp>
       <p:pic>
         <p:nvPicPr>
-          <p:cNvPr id="5" name="Picture 2"/>
+          <p:cNvPr id="4" name="Picture 2"/>
           <p:cNvPicPr>
             <a:picLocks noChangeAspect="1" noChangeArrowheads="1"/>
           </p:cNvPicPr>
@@ -3699,8 +3880,8 @@
         </p:blipFill>
         <p:spPr bwMode="auto">
           <a:xfrm>
-            <a:off x="1331640" y="1196752"/>
-            <a:ext cx="5441950" cy="5505450"/>
+            <a:off x="623888" y="1714500"/>
+            <a:ext cx="7896225" cy="3429000"/>
           </a:xfrm>
           <a:prstGeom prst="rect">
             <a:avLst/>
@@ -3730,10 +3911,56 @@
           </a:extLst>
         </p:spPr>
       </p:pic>
+      <p:sp>
+        <p:nvSpPr>
+          <p:cNvPr id="5" name="สี่เหลี่ยมผืนผ้า 4"/>
+          <p:cNvSpPr/>
+          <p:nvPr/>
+        </p:nvSpPr>
+        <p:spPr>
+          <a:xfrm>
+            <a:off x="971599" y="2204865"/>
+            <a:ext cx="7548513" cy="2938636"/>
+          </a:xfrm>
+          <a:prstGeom prst="rect">
+            <a:avLst/>
+          </a:prstGeom>
+          <a:noFill/>
+          <a:ln>
+            <a:solidFill>
+              <a:schemeClr val="tx1"/>
+            </a:solidFill>
+          </a:ln>
+        </p:spPr>
+        <p:style>
+          <a:lnRef idx="2">
+            <a:schemeClr val="accent1">
+              <a:shade val="50000"/>
+            </a:schemeClr>
+          </a:lnRef>
+          <a:fillRef idx="1">
+            <a:schemeClr val="accent1"/>
+          </a:fillRef>
+          <a:effectRef idx="0">
+            <a:schemeClr val="accent1"/>
+          </a:effectRef>
+          <a:fontRef idx="minor">
+            <a:schemeClr val="lt1"/>
+          </a:fontRef>
+        </p:style>
+        <p:txBody>
+          <a:bodyPr rtlCol="0" anchor="ctr"/>
+          <a:lstStyle/>
+          <a:p>
+            <a:pPr algn="ctr"/>
+            <a:endParaRPr lang="th-TH"/>
+          </a:p>
+        </p:txBody>
+      </p:sp>
     </p:spTree>
     <p:extLst>
       <p:ext uri="{BB962C8B-B14F-4D97-AF65-F5344CB8AC3E}">
-        <p14:creationId xmlns:p14="http://schemas.microsoft.com/office/powerpoint/2010/main" val="1147232801"/>
+        <p14:creationId xmlns:p14="http://schemas.microsoft.com/office/powerpoint/2010/main" val="2006713140"/>
       </p:ext>
     </p:extLst>
   </p:cSld>
@@ -3743,7 +3970,7 @@
 </p:sld>
 </file>
 
-<file path=ppt/slides/slide15.xml><?xml version="1.0" encoding="utf-8"?>
+<file path=ppt/slides/slide16.xml><?xml version="1.0" encoding="utf-8"?>
 <p:sld xmlns:a="http://schemas.openxmlformats.org/drawingml/2006/main" xmlns:r="http://schemas.openxmlformats.org/officeDocument/2006/relationships" xmlns:p="http://schemas.openxmlformats.org/presentationml/2006/main">
   <p:cSld>
     <p:spTree>
@@ -3777,34 +4004,23 @@
           <a:p>
             <a:r>
               <a:rPr lang="en-US" dirty="0" smtClean="0"/>
-              <a:t>Code: House Class</a:t>
+              <a:t>Code: House </a:t>
+            </a:r>
+            <a:r>
+              <a:rPr lang="en-US" dirty="0"/>
+              <a:t>Class (Part </a:t>
+            </a:r>
+            <a:r>
+              <a:rPr lang="en-US" dirty="0" smtClean="0"/>
+              <a:t>2)</a:t>
             </a:r>
             <a:endParaRPr lang="th-TH" dirty="0"/>
-          </a:p>
-        </p:txBody>
-      </p:sp>
-      <p:sp>
-        <p:nvSpPr>
-          <p:cNvPr id="3" name="ตัวแทนเนื้อหา 2"/>
-          <p:cNvSpPr>
-            <a:spLocks noGrp="1"/>
-          </p:cNvSpPr>
-          <p:nvPr>
-            <p:ph idx="1"/>
-          </p:nvPr>
-        </p:nvSpPr>
-        <p:spPr/>
-        <p:txBody>
-          <a:bodyPr/>
-          <a:lstStyle/>
-          <a:p>
-            <a:endParaRPr lang="th-TH"/>
           </a:p>
         </p:txBody>
       </p:sp>
       <p:pic>
         <p:nvPicPr>
-          <p:cNvPr id="12291" name="Picture 3"/>
+          <p:cNvPr id="5" name="Picture 2"/>
           <p:cNvPicPr>
             <a:picLocks noChangeAspect="1" noChangeArrowheads="1"/>
           </p:cNvPicPr>
@@ -3825,8 +4041,8 @@
         </p:blipFill>
         <p:spPr bwMode="auto">
           <a:xfrm>
-            <a:off x="1395870" y="1268759"/>
-            <a:ext cx="6110003" cy="5557339"/>
+            <a:off x="1331640" y="1196752"/>
+            <a:ext cx="5441950" cy="5505450"/>
           </a:xfrm>
           <a:prstGeom prst="rect">
             <a:avLst/>
@@ -3856,10 +4072,102 @@
           </a:extLst>
         </p:spPr>
       </p:pic>
+      <p:sp>
+        <p:nvSpPr>
+          <p:cNvPr id="6" name="สี่เหลี่ยมผืนผ้า 5"/>
+          <p:cNvSpPr/>
+          <p:nvPr/>
+        </p:nvSpPr>
+        <p:spPr>
+          <a:xfrm>
+            <a:off x="1187625" y="1124744"/>
+            <a:ext cx="4824536" cy="1800200"/>
+          </a:xfrm>
+          <a:prstGeom prst="rect">
+            <a:avLst/>
+          </a:prstGeom>
+          <a:noFill/>
+          <a:ln>
+            <a:solidFill>
+              <a:schemeClr val="tx1"/>
+            </a:solidFill>
+          </a:ln>
+        </p:spPr>
+        <p:style>
+          <a:lnRef idx="2">
+            <a:schemeClr val="accent1">
+              <a:shade val="50000"/>
+            </a:schemeClr>
+          </a:lnRef>
+          <a:fillRef idx="1">
+            <a:schemeClr val="accent1"/>
+          </a:fillRef>
+          <a:effectRef idx="0">
+            <a:schemeClr val="accent1"/>
+          </a:effectRef>
+          <a:fontRef idx="minor">
+            <a:schemeClr val="lt1"/>
+          </a:fontRef>
+        </p:style>
+        <p:txBody>
+          <a:bodyPr rtlCol="0" anchor="ctr"/>
+          <a:lstStyle/>
+          <a:p>
+            <a:pPr algn="ctr"/>
+            <a:endParaRPr lang="th-TH"/>
+          </a:p>
+        </p:txBody>
+      </p:sp>
+      <p:sp>
+        <p:nvSpPr>
+          <p:cNvPr id="7" name="สี่เหลี่ยมผืนผ้า 6"/>
+          <p:cNvSpPr/>
+          <p:nvPr/>
+        </p:nvSpPr>
+        <p:spPr>
+          <a:xfrm>
+            <a:off x="1340024" y="2924944"/>
+            <a:ext cx="5608239" cy="3777258"/>
+          </a:xfrm>
+          <a:prstGeom prst="rect">
+            <a:avLst/>
+          </a:prstGeom>
+          <a:noFill/>
+          <a:ln>
+            <a:solidFill>
+              <a:schemeClr val="tx1"/>
+            </a:solidFill>
+          </a:ln>
+        </p:spPr>
+        <p:style>
+          <a:lnRef idx="2">
+            <a:schemeClr val="accent1">
+              <a:shade val="50000"/>
+            </a:schemeClr>
+          </a:lnRef>
+          <a:fillRef idx="1">
+            <a:schemeClr val="accent1"/>
+          </a:fillRef>
+          <a:effectRef idx="0">
+            <a:schemeClr val="accent1"/>
+          </a:effectRef>
+          <a:fontRef idx="minor">
+            <a:schemeClr val="lt1"/>
+          </a:fontRef>
+        </p:style>
+        <p:txBody>
+          <a:bodyPr rtlCol="0" anchor="ctr"/>
+          <a:lstStyle/>
+          <a:p>
+            <a:pPr algn="ctr"/>
+            <a:endParaRPr lang="th-TH"/>
+          </a:p>
+        </p:txBody>
+      </p:sp>
     </p:spTree>
     <p:extLst>
       <p:ext uri="{BB962C8B-B14F-4D97-AF65-F5344CB8AC3E}">
-        <p14:creationId xmlns:p14="http://schemas.microsoft.com/office/powerpoint/2010/main" val="1708150572"/>
+        <p14:creationId xmlns:p14="http://schemas.microsoft.com/office/powerpoint/2010/main" val="1147232801"/>
       </p:ext>
     </p:extLst>
   </p:cSld>
@@ -3869,7 +4177,7 @@
 </p:sld>
 </file>
 
-<file path=ppt/slides/slide16.xml><?xml version="1.0" encoding="utf-8"?>
+<file path=ppt/slides/slide17.xml><?xml version="1.0" encoding="utf-8"?>
 <p:sld xmlns:a="http://schemas.openxmlformats.org/drawingml/2006/main" xmlns:r="http://schemas.openxmlformats.org/officeDocument/2006/relationships" xmlns:p="http://schemas.openxmlformats.org/presentationml/2006/main">
   <p:cSld>
     <p:spTree>
@@ -3903,34 +4211,23 @@
           <a:p>
             <a:r>
               <a:rPr lang="en-US" dirty="0" smtClean="0"/>
-              <a:t>Code: House Class</a:t>
+              <a:t>Code: House </a:t>
+            </a:r>
+            <a:r>
+              <a:rPr lang="en-US" dirty="0"/>
+              <a:t>Class (Part </a:t>
+            </a:r>
+            <a:r>
+              <a:rPr lang="en-US" dirty="0" smtClean="0"/>
+              <a:t>3)</a:t>
             </a:r>
             <a:endParaRPr lang="th-TH" dirty="0"/>
-          </a:p>
-        </p:txBody>
-      </p:sp>
-      <p:sp>
-        <p:nvSpPr>
-          <p:cNvPr id="3" name="ตัวแทนเนื้อหา 2"/>
-          <p:cNvSpPr>
-            <a:spLocks noGrp="1"/>
-          </p:cNvSpPr>
-          <p:nvPr>
-            <p:ph idx="1"/>
-          </p:nvPr>
-        </p:nvSpPr>
-        <p:spPr/>
-        <p:txBody>
-          <a:bodyPr/>
-          <a:lstStyle/>
-          <a:p>
-            <a:endParaRPr lang="th-TH"/>
           </a:p>
         </p:txBody>
       </p:sp>
       <p:pic>
         <p:nvPicPr>
-          <p:cNvPr id="13314" name="Picture 2"/>
+          <p:cNvPr id="12291" name="Picture 3"/>
           <p:cNvPicPr>
             <a:picLocks noChangeAspect="1" noChangeArrowheads="1"/>
           </p:cNvPicPr>
@@ -3951,8 +4248,8 @@
         </p:blipFill>
         <p:spPr bwMode="auto">
           <a:xfrm>
-            <a:off x="1619672" y="1556792"/>
-            <a:ext cx="5931522" cy="4869160"/>
+            <a:off x="1395870" y="1268759"/>
+            <a:ext cx="6110003" cy="5557339"/>
           </a:xfrm>
           <a:prstGeom prst="rect">
             <a:avLst/>
@@ -3982,10 +4279,102 @@
           </a:extLst>
         </p:spPr>
       </p:pic>
+      <p:sp>
+        <p:nvSpPr>
+          <p:cNvPr id="5" name="สี่เหลี่ยมผืนผ้า 4"/>
+          <p:cNvSpPr/>
+          <p:nvPr/>
+        </p:nvSpPr>
+        <p:spPr>
+          <a:xfrm>
+            <a:off x="1646751" y="1253950"/>
+            <a:ext cx="5859122" cy="3777258"/>
+          </a:xfrm>
+          <a:prstGeom prst="rect">
+            <a:avLst/>
+          </a:prstGeom>
+          <a:noFill/>
+          <a:ln>
+            <a:solidFill>
+              <a:schemeClr val="tx1"/>
+            </a:solidFill>
+          </a:ln>
+        </p:spPr>
+        <p:style>
+          <a:lnRef idx="2">
+            <a:schemeClr val="accent1">
+              <a:shade val="50000"/>
+            </a:schemeClr>
+          </a:lnRef>
+          <a:fillRef idx="1">
+            <a:schemeClr val="accent1"/>
+          </a:fillRef>
+          <a:effectRef idx="0">
+            <a:schemeClr val="accent1"/>
+          </a:effectRef>
+          <a:fontRef idx="minor">
+            <a:schemeClr val="lt1"/>
+          </a:fontRef>
+        </p:style>
+        <p:txBody>
+          <a:bodyPr rtlCol="0" anchor="ctr"/>
+          <a:lstStyle/>
+          <a:p>
+            <a:pPr algn="ctr"/>
+            <a:endParaRPr lang="th-TH"/>
+          </a:p>
+        </p:txBody>
+      </p:sp>
+      <p:sp>
+        <p:nvSpPr>
+          <p:cNvPr id="6" name="สี่เหลี่ยมผืนผ้า 5"/>
+          <p:cNvSpPr/>
+          <p:nvPr/>
+        </p:nvSpPr>
+        <p:spPr>
+          <a:xfrm>
+            <a:off x="1331640" y="5085184"/>
+            <a:ext cx="5616624" cy="1754300"/>
+          </a:xfrm>
+          <a:prstGeom prst="rect">
+            <a:avLst/>
+          </a:prstGeom>
+          <a:noFill/>
+          <a:ln>
+            <a:solidFill>
+              <a:schemeClr val="tx1"/>
+            </a:solidFill>
+          </a:ln>
+        </p:spPr>
+        <p:style>
+          <a:lnRef idx="2">
+            <a:schemeClr val="accent1">
+              <a:shade val="50000"/>
+            </a:schemeClr>
+          </a:lnRef>
+          <a:fillRef idx="1">
+            <a:schemeClr val="accent1"/>
+          </a:fillRef>
+          <a:effectRef idx="0">
+            <a:schemeClr val="accent1"/>
+          </a:effectRef>
+          <a:fontRef idx="minor">
+            <a:schemeClr val="lt1"/>
+          </a:fontRef>
+        </p:style>
+        <p:txBody>
+          <a:bodyPr rtlCol="0" anchor="ctr"/>
+          <a:lstStyle/>
+          <a:p>
+            <a:pPr algn="ctr"/>
+            <a:endParaRPr lang="th-TH"/>
+          </a:p>
+        </p:txBody>
+      </p:sp>
     </p:spTree>
     <p:extLst>
       <p:ext uri="{BB962C8B-B14F-4D97-AF65-F5344CB8AC3E}">
-        <p14:creationId xmlns:p14="http://schemas.microsoft.com/office/powerpoint/2010/main" val="2313782976"/>
+        <p14:creationId xmlns:p14="http://schemas.microsoft.com/office/powerpoint/2010/main" val="1708150572"/>
       </p:ext>
     </p:extLst>
   </p:cSld>
@@ -3995,7 +4384,7 @@
 </p:sld>
 </file>
 
-<file path=ppt/slides/slide17.xml><?xml version="1.0" encoding="utf-8"?>
+<file path=ppt/slides/slide18.xml><?xml version="1.0" encoding="utf-8"?>
 <p:sld xmlns:a="http://schemas.openxmlformats.org/drawingml/2006/main" xmlns:r="http://schemas.openxmlformats.org/officeDocument/2006/relationships" xmlns:p="http://schemas.openxmlformats.org/presentationml/2006/main">
   <p:cSld>
     <p:spTree>
@@ -4029,34 +4418,23 @@
           <a:p>
             <a:r>
               <a:rPr lang="en-US" dirty="0" smtClean="0"/>
-              <a:t>Code: Room Class</a:t>
+              <a:t>Code: House </a:t>
+            </a:r>
+            <a:r>
+              <a:rPr lang="en-US" dirty="0"/>
+              <a:t>Class (Part </a:t>
+            </a:r>
+            <a:r>
+              <a:rPr lang="en-US" dirty="0" smtClean="0"/>
+              <a:t>4)</a:t>
             </a:r>
             <a:endParaRPr lang="th-TH" dirty="0"/>
-          </a:p>
-        </p:txBody>
-      </p:sp>
-      <p:sp>
-        <p:nvSpPr>
-          <p:cNvPr id="3" name="ตัวแทนเนื้อหา 2"/>
-          <p:cNvSpPr>
-            <a:spLocks noGrp="1"/>
-          </p:cNvSpPr>
-          <p:nvPr>
-            <p:ph idx="1"/>
-          </p:nvPr>
-        </p:nvSpPr>
-        <p:spPr/>
-        <p:txBody>
-          <a:bodyPr/>
-          <a:lstStyle/>
-          <a:p>
-            <a:endParaRPr lang="th-TH"/>
           </a:p>
         </p:txBody>
       </p:sp>
       <p:pic>
         <p:nvPicPr>
-          <p:cNvPr id="14338" name="Picture 2"/>
+          <p:cNvPr id="13314" name="Picture 2"/>
           <p:cNvPicPr>
             <a:picLocks noChangeAspect="1" noChangeArrowheads="1"/>
           </p:cNvPicPr>
@@ -4077,8 +4455,8 @@
         </p:blipFill>
         <p:spPr bwMode="auto">
           <a:xfrm>
-            <a:off x="1691680" y="1628800"/>
-            <a:ext cx="5048250" cy="4705350"/>
+            <a:off x="1619672" y="1556792"/>
+            <a:ext cx="5931522" cy="4869160"/>
           </a:xfrm>
           <a:prstGeom prst="rect">
             <a:avLst/>
@@ -4108,10 +4486,102 @@
           </a:extLst>
         </p:spPr>
       </p:pic>
+      <p:sp>
+        <p:nvSpPr>
+          <p:cNvPr id="5" name="สี่เหลี่ยมผืนผ้า 4"/>
+          <p:cNvSpPr/>
+          <p:nvPr/>
+        </p:nvSpPr>
+        <p:spPr>
+          <a:xfrm>
+            <a:off x="1399473" y="1556792"/>
+            <a:ext cx="4575008" cy="1800200"/>
+          </a:xfrm>
+          <a:prstGeom prst="rect">
+            <a:avLst/>
+          </a:prstGeom>
+          <a:noFill/>
+          <a:ln>
+            <a:solidFill>
+              <a:schemeClr val="tx1"/>
+            </a:solidFill>
+          </a:ln>
+        </p:spPr>
+        <p:style>
+          <a:lnRef idx="2">
+            <a:schemeClr val="accent1">
+              <a:shade val="50000"/>
+            </a:schemeClr>
+          </a:lnRef>
+          <a:fillRef idx="1">
+            <a:schemeClr val="accent1"/>
+          </a:fillRef>
+          <a:effectRef idx="0">
+            <a:schemeClr val="accent1"/>
+          </a:effectRef>
+          <a:fontRef idx="minor">
+            <a:schemeClr val="lt1"/>
+          </a:fontRef>
+        </p:style>
+        <p:txBody>
+          <a:bodyPr rtlCol="0" anchor="ctr"/>
+          <a:lstStyle/>
+          <a:p>
+            <a:pPr algn="ctr"/>
+            <a:endParaRPr lang="th-TH"/>
+          </a:p>
+        </p:txBody>
+      </p:sp>
+      <p:sp>
+        <p:nvSpPr>
+          <p:cNvPr id="6" name="สี่เหลี่ยมผืนผ้า 5"/>
+          <p:cNvSpPr/>
+          <p:nvPr/>
+        </p:nvSpPr>
+        <p:spPr>
+          <a:xfrm>
+            <a:off x="1545852" y="3356992"/>
+            <a:ext cx="5906468" cy="3168352"/>
+          </a:xfrm>
+          <a:prstGeom prst="rect">
+            <a:avLst/>
+          </a:prstGeom>
+          <a:noFill/>
+          <a:ln>
+            <a:solidFill>
+              <a:schemeClr val="tx1"/>
+            </a:solidFill>
+          </a:ln>
+        </p:spPr>
+        <p:style>
+          <a:lnRef idx="2">
+            <a:schemeClr val="accent1">
+              <a:shade val="50000"/>
+            </a:schemeClr>
+          </a:lnRef>
+          <a:fillRef idx="1">
+            <a:schemeClr val="accent1"/>
+          </a:fillRef>
+          <a:effectRef idx="0">
+            <a:schemeClr val="accent1"/>
+          </a:effectRef>
+          <a:fontRef idx="minor">
+            <a:schemeClr val="lt1"/>
+          </a:fontRef>
+        </p:style>
+        <p:txBody>
+          <a:bodyPr rtlCol="0" anchor="ctr"/>
+          <a:lstStyle/>
+          <a:p>
+            <a:pPr algn="ctr"/>
+            <a:endParaRPr lang="th-TH"/>
+          </a:p>
+        </p:txBody>
+      </p:sp>
     </p:spTree>
     <p:extLst>
       <p:ext uri="{BB962C8B-B14F-4D97-AF65-F5344CB8AC3E}">
-        <p14:creationId xmlns:p14="http://schemas.microsoft.com/office/powerpoint/2010/main" val="1468810767"/>
+        <p14:creationId xmlns:p14="http://schemas.microsoft.com/office/powerpoint/2010/main" val="2313782976"/>
       </p:ext>
     </p:extLst>
   </p:cSld>
@@ -4121,7 +4591,7 @@
 </p:sld>
 </file>
 
-<file path=ppt/slides/slide18.xml><?xml version="1.0" encoding="utf-8"?>
+<file path=ppt/slides/slide19.xml><?xml version="1.0" encoding="utf-8"?>
 <p:sld xmlns:a="http://schemas.openxmlformats.org/drawingml/2006/main" xmlns:r="http://schemas.openxmlformats.org/officeDocument/2006/relationships" xmlns:p="http://schemas.openxmlformats.org/presentationml/2006/main">
   <p:cSld>
     <p:spTree>
@@ -4155,34 +4625,19 @@
           <a:p>
             <a:r>
               <a:rPr lang="en-US" dirty="0" smtClean="0"/>
-              <a:t>Code: Room Class</a:t>
+              <a:t>Code: Room </a:t>
+            </a:r>
+            <a:r>
+              <a:rPr lang="en-US" dirty="0"/>
+              <a:t>Class (Part 1)</a:t>
             </a:r>
             <a:endParaRPr lang="th-TH" dirty="0"/>
-          </a:p>
-        </p:txBody>
-      </p:sp>
-      <p:sp>
-        <p:nvSpPr>
-          <p:cNvPr id="3" name="ตัวแทนเนื้อหา 2"/>
-          <p:cNvSpPr>
-            <a:spLocks noGrp="1"/>
-          </p:cNvSpPr>
-          <p:nvPr>
-            <p:ph idx="1"/>
-          </p:nvPr>
-        </p:nvSpPr>
-        <p:spPr/>
-        <p:txBody>
-          <a:bodyPr/>
-          <a:lstStyle/>
-          <a:p>
-            <a:endParaRPr lang="th-TH"/>
           </a:p>
         </p:txBody>
       </p:sp>
       <p:pic>
         <p:nvPicPr>
-          <p:cNvPr id="11267" name="Picture 3"/>
+          <p:cNvPr id="14338" name="Picture 2"/>
           <p:cNvPicPr>
             <a:picLocks noChangeAspect="1" noChangeArrowheads="1"/>
           </p:cNvPicPr>
@@ -4203,8 +4658,8 @@
         </p:blipFill>
         <p:spPr bwMode="auto">
           <a:xfrm>
-            <a:off x="309562" y="1700808"/>
-            <a:ext cx="8524875" cy="3686175"/>
+            <a:off x="1691680" y="1628800"/>
+            <a:ext cx="5048250" cy="4705350"/>
           </a:xfrm>
           <a:prstGeom prst="rect">
             <a:avLst/>
@@ -4234,136 +4689,148 @@
           </a:extLst>
         </p:spPr>
       </p:pic>
-    </p:spTree>
-    <p:extLst>
-      <p:ext uri="{BB962C8B-B14F-4D97-AF65-F5344CB8AC3E}">
-        <p14:creationId xmlns:p14="http://schemas.microsoft.com/office/powerpoint/2010/main" val="1239488804"/>
-      </p:ext>
-    </p:extLst>
-  </p:cSld>
-  <p:clrMapOvr>
-    <a:masterClrMapping/>
-  </p:clrMapOvr>
-</p:sld>
-</file>
-
-<file path=ppt/slides/slide19.xml><?xml version="1.0" encoding="utf-8"?>
-<p:sld xmlns:a="http://schemas.openxmlformats.org/drawingml/2006/main" xmlns:r="http://schemas.openxmlformats.org/officeDocument/2006/relationships" xmlns:p="http://schemas.openxmlformats.org/presentationml/2006/main">
-  <p:cSld>
-    <p:spTree>
-      <p:nvGrpSpPr>
-        <p:cNvPr id="1" name=""/>
-        <p:cNvGrpSpPr/>
-        <p:nvPr/>
-      </p:nvGrpSpPr>
-      <p:grpSpPr>
-        <a:xfrm>
-          <a:off x="0" y="0"/>
-          <a:ext cx="0" cy="0"/>
-          <a:chOff x="0" y="0"/>
-          <a:chExt cx="0" cy="0"/>
-        </a:xfrm>
-      </p:grpSpPr>
-      <p:sp>
-        <p:nvSpPr>
-          <p:cNvPr id="2" name="ชื่อเรื่อง 1"/>
-          <p:cNvSpPr>
-            <a:spLocks noGrp="1"/>
-          </p:cNvSpPr>
-          <p:nvPr>
-            <p:ph type="title"/>
-          </p:nvPr>
-        </p:nvSpPr>
-        <p:spPr/>
-        <p:txBody>
-          <a:bodyPr/>
-          <a:lstStyle/>
-          <a:p>
-            <a:r>
-              <a:rPr lang="en-US" dirty="0" smtClean="0"/>
-              <a:t>Code: Testing Stages</a:t>
-            </a:r>
-            <a:endParaRPr lang="th-TH" dirty="0"/>
-          </a:p>
-        </p:txBody>
-      </p:sp>
-      <p:sp>
-        <p:nvSpPr>
-          <p:cNvPr id="3" name="ตัวแทนเนื้อหา 2"/>
-          <p:cNvSpPr>
-            <a:spLocks noGrp="1"/>
-          </p:cNvSpPr>
-          <p:nvPr>
-            <p:ph idx="1"/>
-          </p:nvPr>
-        </p:nvSpPr>
-        <p:spPr/>
-        <p:txBody>
-          <a:bodyPr/>
-          <a:lstStyle/>
-          <a:p>
-            <a:endParaRPr lang="th-TH" dirty="0"/>
-          </a:p>
-        </p:txBody>
-      </p:sp>
-      <p:pic>
-        <p:nvPicPr>
-          <p:cNvPr id="4" name="Picture 2"/>
-          <p:cNvPicPr>
-            <a:picLocks noChangeAspect="1" noChangeArrowheads="1"/>
-          </p:cNvPicPr>
+      <p:sp>
+        <p:nvSpPr>
+          <p:cNvPr id="5" name="สี่เหลี่ยมผืนผ้า 4"/>
+          <p:cNvSpPr/>
           <p:nvPr/>
-        </p:nvPicPr>
-        <p:blipFill>
-          <a:blip r:embed="rId2">
-            <a:extLst>
-              <a:ext uri="{28A0092B-C50C-407E-A947-70E740481C1C}">
-                <a14:useLocalDpi xmlns:a14="http://schemas.microsoft.com/office/drawing/2010/main" val="0"/>
-              </a:ext>
-            </a:extLst>
-          </a:blip>
-          <a:srcRect/>
-          <a:stretch>
-            <a:fillRect/>
-          </a:stretch>
-        </p:blipFill>
-        <p:spPr bwMode="auto">
-          <a:xfrm>
-            <a:off x="2339752" y="1340768"/>
-            <a:ext cx="4203819" cy="5051822"/>
+        </p:nvSpPr>
+        <p:spPr>
+          <a:xfrm>
+            <a:off x="1907704" y="1916832"/>
+            <a:ext cx="2376264" cy="1368152"/>
           </a:xfrm>
           <a:prstGeom prst="rect">
             <a:avLst/>
           </a:prstGeom>
           <a:noFill/>
           <a:ln>
-            <a:noFill/>
+            <a:solidFill>
+              <a:schemeClr val="tx1"/>
+            </a:solidFill>
           </a:ln>
-          <a:extLst>
-            <a:ext uri="{909E8E84-426E-40DD-AFC4-6F175D3DCCD1}">
-              <a14:hiddenFill xmlns:a14="http://schemas.microsoft.com/office/drawing/2010/main">
-                <a:solidFill>
-                  <a:schemeClr val="accent1"/>
-                </a:solidFill>
-              </a14:hiddenFill>
-            </a:ext>
-            <a:ext uri="{91240B29-F687-4F45-9708-019B960494DF}">
-              <a14:hiddenLine xmlns:a14="http://schemas.microsoft.com/office/drawing/2010/main" w="9525">
-                <a:solidFill>
-                  <a:schemeClr val="tx1"/>
-                </a:solidFill>
-                <a:miter lim="800000"/>
-                <a:headEnd/>
-                <a:tailEnd/>
-              </a14:hiddenLine>
-            </a:ext>
-          </a:extLst>
-        </p:spPr>
-      </p:pic>
+        </p:spPr>
+        <p:style>
+          <a:lnRef idx="2">
+            <a:schemeClr val="accent1">
+              <a:shade val="50000"/>
+            </a:schemeClr>
+          </a:lnRef>
+          <a:fillRef idx="1">
+            <a:schemeClr val="accent1"/>
+          </a:fillRef>
+          <a:effectRef idx="0">
+            <a:schemeClr val="accent1"/>
+          </a:effectRef>
+          <a:fontRef idx="minor">
+            <a:schemeClr val="lt1"/>
+          </a:fontRef>
+        </p:style>
+        <p:txBody>
+          <a:bodyPr rtlCol="0" anchor="ctr"/>
+          <a:lstStyle/>
+          <a:p>
+            <a:pPr algn="ctr"/>
+            <a:endParaRPr lang="th-TH"/>
+          </a:p>
+        </p:txBody>
+      </p:sp>
+      <p:sp>
+        <p:nvSpPr>
+          <p:cNvPr id="6" name="สี่เหลี่ยมผืนผ้า 5"/>
+          <p:cNvSpPr/>
+          <p:nvPr/>
+        </p:nvSpPr>
+        <p:spPr>
+          <a:xfrm>
+            <a:off x="1872752" y="3297399"/>
+            <a:ext cx="4427439" cy="995697"/>
+          </a:xfrm>
+          <a:prstGeom prst="rect">
+            <a:avLst/>
+          </a:prstGeom>
+          <a:noFill/>
+          <a:ln>
+            <a:solidFill>
+              <a:schemeClr val="tx1"/>
+            </a:solidFill>
+          </a:ln>
+        </p:spPr>
+        <p:style>
+          <a:lnRef idx="2">
+            <a:schemeClr val="accent1">
+              <a:shade val="50000"/>
+            </a:schemeClr>
+          </a:lnRef>
+          <a:fillRef idx="1">
+            <a:schemeClr val="accent1"/>
+          </a:fillRef>
+          <a:effectRef idx="0">
+            <a:schemeClr val="accent1"/>
+          </a:effectRef>
+          <a:fontRef idx="minor">
+            <a:schemeClr val="lt1"/>
+          </a:fontRef>
+        </p:style>
+        <p:txBody>
+          <a:bodyPr rtlCol="0" anchor="ctr"/>
+          <a:lstStyle/>
+          <a:p>
+            <a:pPr algn="ctr"/>
+            <a:endParaRPr lang="th-TH"/>
+          </a:p>
+        </p:txBody>
+      </p:sp>
+      <p:sp>
+        <p:nvSpPr>
+          <p:cNvPr id="7" name="สี่เหลี่ยมผืนผ้า 6"/>
+          <p:cNvSpPr/>
+          <p:nvPr/>
+        </p:nvSpPr>
+        <p:spPr>
+          <a:xfrm>
+            <a:off x="1891729" y="4294779"/>
+            <a:ext cx="4480471" cy="2039371"/>
+          </a:xfrm>
+          <a:prstGeom prst="rect">
+            <a:avLst/>
+          </a:prstGeom>
+          <a:noFill/>
+          <a:ln>
+            <a:solidFill>
+              <a:schemeClr val="tx1"/>
+            </a:solidFill>
+          </a:ln>
+        </p:spPr>
+        <p:style>
+          <a:lnRef idx="2">
+            <a:schemeClr val="accent1">
+              <a:shade val="50000"/>
+            </a:schemeClr>
+          </a:lnRef>
+          <a:fillRef idx="1">
+            <a:schemeClr val="accent1"/>
+          </a:fillRef>
+          <a:effectRef idx="0">
+            <a:schemeClr val="accent1"/>
+          </a:effectRef>
+          <a:fontRef idx="minor">
+            <a:schemeClr val="lt1"/>
+          </a:fontRef>
+        </p:style>
+        <p:txBody>
+          <a:bodyPr rtlCol="0" anchor="ctr"/>
+          <a:lstStyle/>
+          <a:p>
+            <a:pPr algn="ctr"/>
+            <a:endParaRPr lang="th-TH"/>
+          </a:p>
+        </p:txBody>
+      </p:sp>
     </p:spTree>
     <p:extLst>
       <p:ext uri="{BB962C8B-B14F-4D97-AF65-F5344CB8AC3E}">
-        <p14:creationId xmlns:p14="http://schemas.microsoft.com/office/powerpoint/2010/main" val="927952373"/>
+        <p14:creationId xmlns:p14="http://schemas.microsoft.com/office/powerpoint/2010/main" val="1468810767"/>
       </p:ext>
     </p:extLst>
   </p:cSld>
@@ -4515,34 +4982,23 @@
           <a:p>
             <a:r>
               <a:rPr lang="en-US" dirty="0" smtClean="0"/>
-              <a:t>Code: Testing Stages</a:t>
+              <a:t>Code: Room </a:t>
+            </a:r>
+            <a:r>
+              <a:rPr lang="en-US" dirty="0"/>
+              <a:t>Class (Part </a:t>
+            </a:r>
+            <a:r>
+              <a:rPr lang="en-US" dirty="0" smtClean="0"/>
+              <a:t>2)</a:t>
             </a:r>
             <a:endParaRPr lang="th-TH" dirty="0"/>
-          </a:p>
-        </p:txBody>
-      </p:sp>
-      <p:sp>
-        <p:nvSpPr>
-          <p:cNvPr id="3" name="ตัวแทนเนื้อหา 2"/>
-          <p:cNvSpPr>
-            <a:spLocks noGrp="1"/>
-          </p:cNvSpPr>
-          <p:nvPr>
-            <p:ph idx="1"/>
-          </p:nvPr>
-        </p:nvSpPr>
-        <p:spPr/>
-        <p:txBody>
-          <a:bodyPr/>
-          <a:lstStyle/>
-          <a:p>
-            <a:endParaRPr lang="th-TH"/>
           </a:p>
         </p:txBody>
       </p:sp>
       <p:pic>
         <p:nvPicPr>
-          <p:cNvPr id="15363" name="Picture 3"/>
+          <p:cNvPr id="11267" name="Picture 3"/>
           <p:cNvPicPr>
             <a:picLocks noChangeAspect="1" noChangeArrowheads="1"/>
           </p:cNvPicPr>
@@ -4563,8 +5019,8 @@
         </p:blipFill>
         <p:spPr bwMode="auto">
           <a:xfrm>
-            <a:off x="1736725" y="1484784"/>
-            <a:ext cx="5670550" cy="4845050"/>
+            <a:off x="309562" y="1700808"/>
+            <a:ext cx="8524875" cy="3686175"/>
           </a:xfrm>
           <a:prstGeom prst="rect">
             <a:avLst/>
@@ -4594,10 +5050,1118 @@
           </a:extLst>
         </p:spPr>
       </p:pic>
+      <p:sp>
+        <p:nvSpPr>
+          <p:cNvPr id="5" name="สี่เหลี่ยมผืนผ้า 4"/>
+          <p:cNvSpPr/>
+          <p:nvPr/>
+        </p:nvSpPr>
+        <p:spPr>
+          <a:xfrm>
+            <a:off x="539552" y="1721266"/>
+            <a:ext cx="8208912" cy="3665717"/>
+          </a:xfrm>
+          <a:prstGeom prst="rect">
+            <a:avLst/>
+          </a:prstGeom>
+          <a:noFill/>
+          <a:ln>
+            <a:solidFill>
+              <a:schemeClr val="tx1"/>
+            </a:solidFill>
+          </a:ln>
+        </p:spPr>
+        <p:style>
+          <a:lnRef idx="2">
+            <a:schemeClr val="accent1">
+              <a:shade val="50000"/>
+            </a:schemeClr>
+          </a:lnRef>
+          <a:fillRef idx="1">
+            <a:schemeClr val="accent1"/>
+          </a:fillRef>
+          <a:effectRef idx="0">
+            <a:schemeClr val="accent1"/>
+          </a:effectRef>
+          <a:fontRef idx="minor">
+            <a:schemeClr val="lt1"/>
+          </a:fontRef>
+        </p:style>
+        <p:txBody>
+          <a:bodyPr rtlCol="0" anchor="ctr"/>
+          <a:lstStyle/>
+          <a:p>
+            <a:pPr algn="ctr"/>
+            <a:endParaRPr lang="th-TH"/>
+          </a:p>
+        </p:txBody>
+      </p:sp>
+    </p:spTree>
+    <p:extLst>
+      <p:ext uri="{BB962C8B-B14F-4D97-AF65-F5344CB8AC3E}">
+        <p14:creationId xmlns:p14="http://schemas.microsoft.com/office/powerpoint/2010/main" val="1239488804"/>
+      </p:ext>
+    </p:extLst>
+  </p:cSld>
+  <p:clrMapOvr>
+    <a:masterClrMapping/>
+  </p:clrMapOvr>
+</p:sld>
+</file>
+
+<file path=ppt/slides/slide21.xml><?xml version="1.0" encoding="utf-8"?>
+<p:sld xmlns:a="http://schemas.openxmlformats.org/drawingml/2006/main" xmlns:r="http://schemas.openxmlformats.org/officeDocument/2006/relationships" xmlns:p="http://schemas.openxmlformats.org/presentationml/2006/main">
+  <p:cSld>
+    <p:spTree>
+      <p:nvGrpSpPr>
+        <p:cNvPr id="1" name=""/>
+        <p:cNvGrpSpPr/>
+        <p:nvPr/>
+      </p:nvGrpSpPr>
+      <p:grpSpPr>
+        <a:xfrm>
+          <a:off x="0" y="0"/>
+          <a:ext cx="0" cy="0"/>
+          <a:chOff x="0" y="0"/>
+          <a:chExt cx="0" cy="0"/>
+        </a:xfrm>
+      </p:grpSpPr>
+      <p:sp>
+        <p:nvSpPr>
+          <p:cNvPr id="2" name="ชื่อเรื่อง 1"/>
+          <p:cNvSpPr>
+            <a:spLocks noGrp="1"/>
+          </p:cNvSpPr>
+          <p:nvPr>
+            <p:ph type="title"/>
+          </p:nvPr>
+        </p:nvSpPr>
+        <p:spPr/>
+        <p:txBody>
+          <a:bodyPr/>
+          <a:lstStyle/>
+          <a:p>
+            <a:r>
+              <a:rPr lang="en-US" dirty="0" smtClean="0"/>
+              <a:t>Code: Testing </a:t>
+            </a:r>
+            <a:r>
+              <a:rPr lang="en-US" dirty="0"/>
+              <a:t>Stages (Part 1)</a:t>
+            </a:r>
+            <a:endParaRPr lang="th-TH" dirty="0"/>
+          </a:p>
+        </p:txBody>
+      </p:sp>
+      <p:pic>
+        <p:nvPicPr>
+          <p:cNvPr id="4" name="Picture 2"/>
+          <p:cNvPicPr>
+            <a:picLocks noChangeAspect="1" noChangeArrowheads="1"/>
+          </p:cNvPicPr>
+          <p:nvPr/>
+        </p:nvPicPr>
+        <p:blipFill>
+          <a:blip r:embed="rId2">
+            <a:extLst>
+              <a:ext uri="{28A0092B-C50C-407E-A947-70E740481C1C}">
+                <a14:useLocalDpi xmlns:a14="http://schemas.microsoft.com/office/drawing/2010/main" val="0"/>
+              </a:ext>
+            </a:extLst>
+          </a:blip>
+          <a:srcRect/>
+          <a:stretch>
+            <a:fillRect/>
+          </a:stretch>
+        </p:blipFill>
+        <p:spPr bwMode="auto">
+          <a:xfrm>
+            <a:off x="2339752" y="1340768"/>
+            <a:ext cx="4203819" cy="5051822"/>
+          </a:xfrm>
+          <a:prstGeom prst="rect">
+            <a:avLst/>
+          </a:prstGeom>
+          <a:noFill/>
+          <a:ln>
+            <a:noFill/>
+          </a:ln>
+          <a:extLst>
+            <a:ext uri="{909E8E84-426E-40DD-AFC4-6F175D3DCCD1}">
+              <a14:hiddenFill xmlns:a14="http://schemas.microsoft.com/office/drawing/2010/main">
+                <a:solidFill>
+                  <a:schemeClr val="accent1"/>
+                </a:solidFill>
+              </a14:hiddenFill>
+            </a:ext>
+            <a:ext uri="{91240B29-F687-4F45-9708-019B960494DF}">
+              <a14:hiddenLine xmlns:a14="http://schemas.microsoft.com/office/drawing/2010/main" w="9525">
+                <a:solidFill>
+                  <a:schemeClr val="tx1"/>
+                </a:solidFill>
+                <a:miter lim="800000"/>
+                <a:headEnd/>
+                <a:tailEnd/>
+              </a14:hiddenLine>
+            </a:ext>
+          </a:extLst>
+        </p:spPr>
+      </p:pic>
+      <p:sp>
+        <p:nvSpPr>
+          <p:cNvPr id="5" name="สี่เหลี่ยมผืนผ้า 4"/>
+          <p:cNvSpPr/>
+          <p:nvPr/>
+        </p:nvSpPr>
+        <p:spPr>
+          <a:xfrm>
+            <a:off x="2339752" y="1340768"/>
+            <a:ext cx="1944216" cy="792088"/>
+          </a:xfrm>
+          <a:prstGeom prst="rect">
+            <a:avLst/>
+          </a:prstGeom>
+          <a:noFill/>
+          <a:ln>
+            <a:solidFill>
+              <a:schemeClr val="tx1"/>
+            </a:solidFill>
+          </a:ln>
+        </p:spPr>
+        <p:style>
+          <a:lnRef idx="2">
+            <a:schemeClr val="accent1">
+              <a:shade val="50000"/>
+            </a:schemeClr>
+          </a:lnRef>
+          <a:fillRef idx="1">
+            <a:schemeClr val="accent1"/>
+          </a:fillRef>
+          <a:effectRef idx="0">
+            <a:schemeClr val="accent1"/>
+          </a:effectRef>
+          <a:fontRef idx="minor">
+            <a:schemeClr val="lt1"/>
+          </a:fontRef>
+        </p:style>
+        <p:txBody>
+          <a:bodyPr rtlCol="0" anchor="ctr"/>
+          <a:lstStyle/>
+          <a:p>
+            <a:pPr algn="ctr"/>
+            <a:endParaRPr lang="th-TH"/>
+          </a:p>
+        </p:txBody>
+      </p:sp>
+      <p:sp>
+        <p:nvSpPr>
+          <p:cNvPr id="6" name="สี่เหลี่ยมผืนผ้า 5"/>
+          <p:cNvSpPr/>
+          <p:nvPr/>
+        </p:nvSpPr>
+        <p:spPr>
+          <a:xfrm>
+            <a:off x="2312689" y="2228106"/>
+            <a:ext cx="4230881" cy="1056878"/>
+          </a:xfrm>
+          <a:prstGeom prst="rect">
+            <a:avLst/>
+          </a:prstGeom>
+          <a:noFill/>
+          <a:ln>
+            <a:solidFill>
+              <a:schemeClr val="tx1"/>
+            </a:solidFill>
+          </a:ln>
+        </p:spPr>
+        <p:style>
+          <a:lnRef idx="2">
+            <a:schemeClr val="accent1">
+              <a:shade val="50000"/>
+            </a:schemeClr>
+          </a:lnRef>
+          <a:fillRef idx="1">
+            <a:schemeClr val="accent1"/>
+          </a:fillRef>
+          <a:effectRef idx="0">
+            <a:schemeClr val="accent1"/>
+          </a:effectRef>
+          <a:fontRef idx="minor">
+            <a:schemeClr val="lt1"/>
+          </a:fontRef>
+        </p:style>
+        <p:txBody>
+          <a:bodyPr rtlCol="0" anchor="ctr"/>
+          <a:lstStyle/>
+          <a:p>
+            <a:pPr algn="ctr"/>
+            <a:endParaRPr lang="th-TH"/>
+          </a:p>
+        </p:txBody>
+      </p:sp>
+      <p:sp>
+        <p:nvSpPr>
+          <p:cNvPr id="7" name="สี่เหลี่ยมผืนผ้า 6"/>
+          <p:cNvSpPr/>
+          <p:nvPr/>
+        </p:nvSpPr>
+        <p:spPr>
+          <a:xfrm>
+            <a:off x="2312688" y="3284984"/>
+            <a:ext cx="4230881" cy="864096"/>
+          </a:xfrm>
+          <a:prstGeom prst="rect">
+            <a:avLst/>
+          </a:prstGeom>
+          <a:noFill/>
+          <a:ln>
+            <a:solidFill>
+              <a:schemeClr val="tx1"/>
+            </a:solidFill>
+          </a:ln>
+        </p:spPr>
+        <p:style>
+          <a:lnRef idx="2">
+            <a:schemeClr val="accent1">
+              <a:shade val="50000"/>
+            </a:schemeClr>
+          </a:lnRef>
+          <a:fillRef idx="1">
+            <a:schemeClr val="accent1"/>
+          </a:fillRef>
+          <a:effectRef idx="0">
+            <a:schemeClr val="accent1"/>
+          </a:effectRef>
+          <a:fontRef idx="minor">
+            <a:schemeClr val="lt1"/>
+          </a:fontRef>
+        </p:style>
+        <p:txBody>
+          <a:bodyPr rtlCol="0" anchor="ctr"/>
+          <a:lstStyle/>
+          <a:p>
+            <a:pPr algn="ctr"/>
+            <a:endParaRPr lang="th-TH"/>
+          </a:p>
+        </p:txBody>
+      </p:sp>
+      <p:sp>
+        <p:nvSpPr>
+          <p:cNvPr id="8" name="สี่เหลี่ยมผืนผ้า 7"/>
+          <p:cNvSpPr/>
+          <p:nvPr/>
+        </p:nvSpPr>
+        <p:spPr>
+          <a:xfrm>
+            <a:off x="2326220" y="4149080"/>
+            <a:ext cx="4230881" cy="936104"/>
+          </a:xfrm>
+          <a:prstGeom prst="rect">
+            <a:avLst/>
+          </a:prstGeom>
+          <a:noFill/>
+          <a:ln>
+            <a:solidFill>
+              <a:schemeClr val="tx1"/>
+            </a:solidFill>
+          </a:ln>
+        </p:spPr>
+        <p:style>
+          <a:lnRef idx="2">
+            <a:schemeClr val="accent1">
+              <a:shade val="50000"/>
+            </a:schemeClr>
+          </a:lnRef>
+          <a:fillRef idx="1">
+            <a:schemeClr val="accent1"/>
+          </a:fillRef>
+          <a:effectRef idx="0">
+            <a:schemeClr val="accent1"/>
+          </a:effectRef>
+          <a:fontRef idx="minor">
+            <a:schemeClr val="lt1"/>
+          </a:fontRef>
+        </p:style>
+        <p:txBody>
+          <a:bodyPr rtlCol="0" anchor="ctr"/>
+          <a:lstStyle/>
+          <a:p>
+            <a:pPr algn="ctr"/>
+            <a:endParaRPr lang="th-TH"/>
+          </a:p>
+        </p:txBody>
+      </p:sp>
+      <p:sp>
+        <p:nvSpPr>
+          <p:cNvPr id="9" name="สี่เหลี่ยมผืนผ้า 8"/>
+          <p:cNvSpPr/>
+          <p:nvPr/>
+        </p:nvSpPr>
+        <p:spPr>
+          <a:xfrm>
+            <a:off x="2312687" y="5085184"/>
+            <a:ext cx="4230881" cy="1368152"/>
+          </a:xfrm>
+          <a:prstGeom prst="rect">
+            <a:avLst/>
+          </a:prstGeom>
+          <a:noFill/>
+          <a:ln>
+            <a:solidFill>
+              <a:schemeClr val="tx1"/>
+            </a:solidFill>
+          </a:ln>
+        </p:spPr>
+        <p:style>
+          <a:lnRef idx="2">
+            <a:schemeClr val="accent1">
+              <a:shade val="50000"/>
+            </a:schemeClr>
+          </a:lnRef>
+          <a:fillRef idx="1">
+            <a:schemeClr val="accent1"/>
+          </a:fillRef>
+          <a:effectRef idx="0">
+            <a:schemeClr val="accent1"/>
+          </a:effectRef>
+          <a:fontRef idx="minor">
+            <a:schemeClr val="lt1"/>
+          </a:fontRef>
+        </p:style>
+        <p:txBody>
+          <a:bodyPr rtlCol="0" anchor="ctr"/>
+          <a:lstStyle/>
+          <a:p>
+            <a:pPr algn="ctr"/>
+            <a:endParaRPr lang="th-TH"/>
+          </a:p>
+        </p:txBody>
+      </p:sp>
+      <p:sp>
+        <p:nvSpPr>
+          <p:cNvPr id="10" name="TextBox 9"/>
+          <p:cNvSpPr txBox="1"/>
+          <p:nvPr/>
+        </p:nvSpPr>
+        <p:spPr>
+          <a:xfrm>
+            <a:off x="1367644" y="1567535"/>
+            <a:ext cx="945045" cy="338554"/>
+          </a:xfrm>
+          <a:prstGeom prst="rect">
+            <a:avLst/>
+          </a:prstGeom>
+          <a:noFill/>
+        </p:spPr>
+        <p:txBody>
+          <a:bodyPr wrap="square" rtlCol="0">
+            <a:spAutoFit/>
+          </a:bodyPr>
+          <a:lstStyle/>
+          <a:p>
+            <a:r>
+              <a:rPr lang="en-US" sz="1600" dirty="0" smtClean="0"/>
+              <a:t>Initialize</a:t>
+            </a:r>
+            <a:endParaRPr lang="th-TH" sz="1600" dirty="0"/>
+          </a:p>
+        </p:txBody>
+      </p:sp>
+      <p:sp>
+        <p:nvSpPr>
+          <p:cNvPr id="11" name="TextBox 10"/>
+          <p:cNvSpPr txBox="1"/>
+          <p:nvPr/>
+        </p:nvSpPr>
+        <p:spPr>
+          <a:xfrm>
+            <a:off x="1331640" y="2587268"/>
+            <a:ext cx="945045" cy="338554"/>
+          </a:xfrm>
+          <a:prstGeom prst="rect">
+            <a:avLst/>
+          </a:prstGeom>
+          <a:noFill/>
+        </p:spPr>
+        <p:txBody>
+          <a:bodyPr wrap="square" rtlCol="0">
+            <a:spAutoFit/>
+          </a:bodyPr>
+          <a:lstStyle/>
+          <a:p>
+            <a:r>
+              <a:rPr lang="en-US" sz="1600" dirty="0" smtClean="0"/>
+              <a:t>Stage 1</a:t>
+            </a:r>
+            <a:endParaRPr lang="th-TH" sz="1600" dirty="0"/>
+          </a:p>
+        </p:txBody>
+      </p:sp>
+      <p:sp>
+        <p:nvSpPr>
+          <p:cNvPr id="12" name="TextBox 11"/>
+          <p:cNvSpPr txBox="1"/>
+          <p:nvPr/>
+        </p:nvSpPr>
+        <p:spPr>
+          <a:xfrm>
+            <a:off x="1369716" y="3528125"/>
+            <a:ext cx="945045" cy="338554"/>
+          </a:xfrm>
+          <a:prstGeom prst="rect">
+            <a:avLst/>
+          </a:prstGeom>
+          <a:noFill/>
+        </p:spPr>
+        <p:txBody>
+          <a:bodyPr wrap="square" rtlCol="0">
+            <a:spAutoFit/>
+          </a:bodyPr>
+          <a:lstStyle/>
+          <a:p>
+            <a:r>
+              <a:rPr lang="en-US" sz="1600" dirty="0" smtClean="0"/>
+              <a:t>Stage 2</a:t>
+            </a:r>
+            <a:endParaRPr lang="th-TH" sz="1600" dirty="0"/>
+          </a:p>
+        </p:txBody>
+      </p:sp>
+      <p:sp>
+        <p:nvSpPr>
+          <p:cNvPr id="13" name="TextBox 12"/>
+          <p:cNvSpPr txBox="1"/>
+          <p:nvPr/>
+        </p:nvSpPr>
+        <p:spPr>
+          <a:xfrm>
+            <a:off x="1381175" y="4447855"/>
+            <a:ext cx="945045" cy="338554"/>
+          </a:xfrm>
+          <a:prstGeom prst="rect">
+            <a:avLst/>
+          </a:prstGeom>
+          <a:noFill/>
+        </p:spPr>
+        <p:txBody>
+          <a:bodyPr wrap="square" rtlCol="0">
+            <a:spAutoFit/>
+          </a:bodyPr>
+          <a:lstStyle/>
+          <a:p>
+            <a:r>
+              <a:rPr lang="en-US" sz="1600" dirty="0" smtClean="0"/>
+              <a:t>Stage 3</a:t>
+            </a:r>
+            <a:endParaRPr lang="th-TH" sz="1600" dirty="0"/>
+          </a:p>
+        </p:txBody>
+      </p:sp>
+      <p:sp>
+        <p:nvSpPr>
+          <p:cNvPr id="14" name="TextBox 13"/>
+          <p:cNvSpPr txBox="1"/>
+          <p:nvPr/>
+        </p:nvSpPr>
+        <p:spPr>
+          <a:xfrm>
+            <a:off x="1381174" y="5599983"/>
+            <a:ext cx="945045" cy="338554"/>
+          </a:xfrm>
+          <a:prstGeom prst="rect">
+            <a:avLst/>
+          </a:prstGeom>
+          <a:noFill/>
+        </p:spPr>
+        <p:txBody>
+          <a:bodyPr wrap="square" rtlCol="0">
+            <a:spAutoFit/>
+          </a:bodyPr>
+          <a:lstStyle/>
+          <a:p>
+            <a:r>
+              <a:rPr lang="en-US" sz="1600" dirty="0" smtClean="0"/>
+              <a:t>Stage 4</a:t>
+            </a:r>
+            <a:endParaRPr lang="th-TH" sz="1600" dirty="0"/>
+          </a:p>
+        </p:txBody>
+      </p:sp>
+    </p:spTree>
+    <p:extLst>
+      <p:ext uri="{BB962C8B-B14F-4D97-AF65-F5344CB8AC3E}">
+        <p14:creationId xmlns:p14="http://schemas.microsoft.com/office/powerpoint/2010/main" val="927952373"/>
+      </p:ext>
+    </p:extLst>
+  </p:cSld>
+  <p:clrMapOvr>
+    <a:masterClrMapping/>
+  </p:clrMapOvr>
+</p:sld>
+</file>
+
+<file path=ppt/slides/slide22.xml><?xml version="1.0" encoding="utf-8"?>
+<p:sld xmlns:a="http://schemas.openxmlformats.org/drawingml/2006/main" xmlns:r="http://schemas.openxmlformats.org/officeDocument/2006/relationships" xmlns:p="http://schemas.openxmlformats.org/presentationml/2006/main">
+  <p:cSld>
+    <p:spTree>
+      <p:nvGrpSpPr>
+        <p:cNvPr id="1" name=""/>
+        <p:cNvGrpSpPr/>
+        <p:nvPr/>
+      </p:nvGrpSpPr>
+      <p:grpSpPr>
+        <a:xfrm>
+          <a:off x="0" y="0"/>
+          <a:ext cx="0" cy="0"/>
+          <a:chOff x="0" y="0"/>
+          <a:chExt cx="0" cy="0"/>
+        </a:xfrm>
+      </p:grpSpPr>
+      <p:sp>
+        <p:nvSpPr>
+          <p:cNvPr id="2" name="ชื่อเรื่อง 1"/>
+          <p:cNvSpPr>
+            <a:spLocks noGrp="1"/>
+          </p:cNvSpPr>
+          <p:nvPr>
+            <p:ph type="title"/>
+          </p:nvPr>
+        </p:nvSpPr>
+        <p:spPr/>
+        <p:txBody>
+          <a:bodyPr/>
+          <a:lstStyle/>
+          <a:p>
+            <a:r>
+              <a:rPr lang="en-US" dirty="0" smtClean="0"/>
+              <a:t>Code: Testing </a:t>
+            </a:r>
+            <a:r>
+              <a:rPr lang="en-US" dirty="0"/>
+              <a:t>Stages (Part </a:t>
+            </a:r>
+            <a:r>
+              <a:rPr lang="en-US" dirty="0" smtClean="0"/>
+              <a:t>2)</a:t>
+            </a:r>
+            <a:endParaRPr lang="th-TH" dirty="0"/>
+          </a:p>
+        </p:txBody>
+      </p:sp>
+      <p:pic>
+        <p:nvPicPr>
+          <p:cNvPr id="15363" name="Picture 3"/>
+          <p:cNvPicPr>
+            <a:picLocks noChangeAspect="1" noChangeArrowheads="1"/>
+          </p:cNvPicPr>
+          <p:nvPr/>
+        </p:nvPicPr>
+        <p:blipFill>
+          <a:blip r:embed="rId2">
+            <a:extLst>
+              <a:ext uri="{28A0092B-C50C-407E-A947-70E740481C1C}">
+                <a14:useLocalDpi xmlns:a14="http://schemas.microsoft.com/office/drawing/2010/main" val="0"/>
+              </a:ext>
+            </a:extLst>
+          </a:blip>
+          <a:srcRect/>
+          <a:stretch>
+            <a:fillRect/>
+          </a:stretch>
+        </p:blipFill>
+        <p:spPr bwMode="auto">
+          <a:xfrm>
+            <a:off x="1736725" y="1484784"/>
+            <a:ext cx="5670550" cy="4845050"/>
+          </a:xfrm>
+          <a:prstGeom prst="rect">
+            <a:avLst/>
+          </a:prstGeom>
+          <a:noFill/>
+          <a:ln>
+            <a:noFill/>
+          </a:ln>
+          <a:extLst>
+            <a:ext uri="{909E8E84-426E-40DD-AFC4-6F175D3DCCD1}">
+              <a14:hiddenFill xmlns:a14="http://schemas.microsoft.com/office/drawing/2010/main">
+                <a:solidFill>
+                  <a:schemeClr val="accent1"/>
+                </a:solidFill>
+              </a14:hiddenFill>
+            </a:ext>
+            <a:ext uri="{91240B29-F687-4F45-9708-019B960494DF}">
+              <a14:hiddenLine xmlns:a14="http://schemas.microsoft.com/office/drawing/2010/main" w="9525">
+                <a:solidFill>
+                  <a:schemeClr val="tx1"/>
+                </a:solidFill>
+                <a:miter lim="800000"/>
+                <a:headEnd/>
+                <a:tailEnd/>
+              </a14:hiddenLine>
+            </a:ext>
+          </a:extLst>
+        </p:spPr>
+      </p:pic>
+      <p:sp>
+        <p:nvSpPr>
+          <p:cNvPr id="5" name="สี่เหลี่ยมผืนผ้า 4"/>
+          <p:cNvSpPr/>
+          <p:nvPr/>
+        </p:nvSpPr>
+        <p:spPr>
+          <a:xfrm>
+            <a:off x="1619672" y="1340768"/>
+            <a:ext cx="5616624" cy="1296144"/>
+          </a:xfrm>
+          <a:prstGeom prst="rect">
+            <a:avLst/>
+          </a:prstGeom>
+          <a:noFill/>
+          <a:ln>
+            <a:solidFill>
+              <a:schemeClr val="tx1"/>
+            </a:solidFill>
+          </a:ln>
+        </p:spPr>
+        <p:style>
+          <a:lnRef idx="2">
+            <a:schemeClr val="accent1">
+              <a:shade val="50000"/>
+            </a:schemeClr>
+          </a:lnRef>
+          <a:fillRef idx="1">
+            <a:schemeClr val="accent1"/>
+          </a:fillRef>
+          <a:effectRef idx="0">
+            <a:schemeClr val="accent1"/>
+          </a:effectRef>
+          <a:fontRef idx="minor">
+            <a:schemeClr val="lt1"/>
+          </a:fontRef>
+        </p:style>
+        <p:txBody>
+          <a:bodyPr rtlCol="0" anchor="ctr"/>
+          <a:lstStyle/>
+          <a:p>
+            <a:pPr algn="ctr"/>
+            <a:endParaRPr lang="th-TH"/>
+          </a:p>
+        </p:txBody>
+      </p:sp>
+      <p:sp>
+        <p:nvSpPr>
+          <p:cNvPr id="6" name="สี่เหลี่ยมผืนผ้า 5"/>
+          <p:cNvSpPr/>
+          <p:nvPr/>
+        </p:nvSpPr>
+        <p:spPr>
+          <a:xfrm>
+            <a:off x="1621905" y="2623094"/>
+            <a:ext cx="5616624" cy="1093938"/>
+          </a:xfrm>
+          <a:prstGeom prst="rect">
+            <a:avLst/>
+          </a:prstGeom>
+          <a:noFill/>
+          <a:ln>
+            <a:solidFill>
+              <a:schemeClr val="tx1"/>
+            </a:solidFill>
+          </a:ln>
+        </p:spPr>
+        <p:style>
+          <a:lnRef idx="2">
+            <a:schemeClr val="accent1">
+              <a:shade val="50000"/>
+            </a:schemeClr>
+          </a:lnRef>
+          <a:fillRef idx="1">
+            <a:schemeClr val="accent1"/>
+          </a:fillRef>
+          <a:effectRef idx="0">
+            <a:schemeClr val="accent1"/>
+          </a:effectRef>
+          <a:fontRef idx="minor">
+            <a:schemeClr val="lt1"/>
+          </a:fontRef>
+        </p:style>
+        <p:txBody>
+          <a:bodyPr rtlCol="0" anchor="ctr"/>
+          <a:lstStyle/>
+          <a:p>
+            <a:pPr algn="ctr"/>
+            <a:endParaRPr lang="th-TH"/>
+          </a:p>
+        </p:txBody>
+      </p:sp>
+      <p:sp>
+        <p:nvSpPr>
+          <p:cNvPr id="7" name="สี่เหลี่ยมผืนผ้า 6"/>
+          <p:cNvSpPr/>
+          <p:nvPr/>
+        </p:nvSpPr>
+        <p:spPr>
+          <a:xfrm>
+            <a:off x="1619672" y="3717032"/>
+            <a:ext cx="5616624" cy="1008112"/>
+          </a:xfrm>
+          <a:prstGeom prst="rect">
+            <a:avLst/>
+          </a:prstGeom>
+          <a:noFill/>
+          <a:ln>
+            <a:solidFill>
+              <a:schemeClr val="tx1"/>
+            </a:solidFill>
+          </a:ln>
+        </p:spPr>
+        <p:style>
+          <a:lnRef idx="2">
+            <a:schemeClr val="accent1">
+              <a:shade val="50000"/>
+            </a:schemeClr>
+          </a:lnRef>
+          <a:fillRef idx="1">
+            <a:schemeClr val="accent1"/>
+          </a:fillRef>
+          <a:effectRef idx="0">
+            <a:schemeClr val="accent1"/>
+          </a:effectRef>
+          <a:fontRef idx="minor">
+            <a:schemeClr val="lt1"/>
+          </a:fontRef>
+        </p:style>
+        <p:txBody>
+          <a:bodyPr rtlCol="0" anchor="ctr"/>
+          <a:lstStyle/>
+          <a:p>
+            <a:pPr algn="ctr"/>
+            <a:endParaRPr lang="th-TH"/>
+          </a:p>
+        </p:txBody>
+      </p:sp>
+      <p:sp>
+        <p:nvSpPr>
+          <p:cNvPr id="8" name="สี่เหลี่ยมผืนผ้า 7"/>
+          <p:cNvSpPr/>
+          <p:nvPr/>
+        </p:nvSpPr>
+        <p:spPr>
+          <a:xfrm>
+            <a:off x="1610010" y="4714494"/>
+            <a:ext cx="5616624" cy="802738"/>
+          </a:xfrm>
+          <a:prstGeom prst="rect">
+            <a:avLst/>
+          </a:prstGeom>
+          <a:noFill/>
+          <a:ln>
+            <a:solidFill>
+              <a:schemeClr val="tx1"/>
+            </a:solidFill>
+          </a:ln>
+        </p:spPr>
+        <p:style>
+          <a:lnRef idx="2">
+            <a:schemeClr val="accent1">
+              <a:shade val="50000"/>
+            </a:schemeClr>
+          </a:lnRef>
+          <a:fillRef idx="1">
+            <a:schemeClr val="accent1"/>
+          </a:fillRef>
+          <a:effectRef idx="0">
+            <a:schemeClr val="accent1"/>
+          </a:effectRef>
+          <a:fontRef idx="minor">
+            <a:schemeClr val="lt1"/>
+          </a:fontRef>
+        </p:style>
+        <p:txBody>
+          <a:bodyPr rtlCol="0" anchor="ctr"/>
+          <a:lstStyle/>
+          <a:p>
+            <a:pPr algn="ctr"/>
+            <a:endParaRPr lang="th-TH"/>
+          </a:p>
+        </p:txBody>
+      </p:sp>
+      <p:sp>
+        <p:nvSpPr>
+          <p:cNvPr id="9" name="สี่เหลี่ยมผืนผ้า 8"/>
+          <p:cNvSpPr/>
+          <p:nvPr/>
+        </p:nvSpPr>
+        <p:spPr>
+          <a:xfrm>
+            <a:off x="1598793" y="5527096"/>
+            <a:ext cx="5616624" cy="802738"/>
+          </a:xfrm>
+          <a:prstGeom prst="rect">
+            <a:avLst/>
+          </a:prstGeom>
+          <a:noFill/>
+          <a:ln>
+            <a:solidFill>
+              <a:schemeClr val="tx1"/>
+            </a:solidFill>
+          </a:ln>
+        </p:spPr>
+        <p:style>
+          <a:lnRef idx="2">
+            <a:schemeClr val="accent1">
+              <a:shade val="50000"/>
+            </a:schemeClr>
+          </a:lnRef>
+          <a:fillRef idx="1">
+            <a:schemeClr val="accent1"/>
+          </a:fillRef>
+          <a:effectRef idx="0">
+            <a:schemeClr val="accent1"/>
+          </a:effectRef>
+          <a:fontRef idx="minor">
+            <a:schemeClr val="lt1"/>
+          </a:fontRef>
+        </p:style>
+        <p:txBody>
+          <a:bodyPr rtlCol="0" anchor="ctr"/>
+          <a:lstStyle/>
+          <a:p>
+            <a:pPr algn="ctr"/>
+            <a:endParaRPr lang="th-TH"/>
+          </a:p>
+        </p:txBody>
+      </p:sp>
+      <p:sp>
+        <p:nvSpPr>
+          <p:cNvPr id="10" name="TextBox 9"/>
+          <p:cNvSpPr txBox="1"/>
+          <p:nvPr/>
+        </p:nvSpPr>
+        <p:spPr>
+          <a:xfrm>
+            <a:off x="647340" y="1819563"/>
+            <a:ext cx="945045" cy="338554"/>
+          </a:xfrm>
+          <a:prstGeom prst="rect">
+            <a:avLst/>
+          </a:prstGeom>
+          <a:noFill/>
+        </p:spPr>
+        <p:txBody>
+          <a:bodyPr wrap="square" rtlCol="0">
+            <a:spAutoFit/>
+          </a:bodyPr>
+          <a:lstStyle/>
+          <a:p>
+            <a:r>
+              <a:rPr lang="en-US" sz="1600" dirty="0" smtClean="0"/>
+              <a:t>Stage 5</a:t>
+            </a:r>
+            <a:endParaRPr lang="th-TH" sz="1600" dirty="0"/>
+          </a:p>
+        </p:txBody>
+      </p:sp>
+      <p:sp>
+        <p:nvSpPr>
+          <p:cNvPr id="11" name="TextBox 10"/>
+          <p:cNvSpPr txBox="1"/>
+          <p:nvPr/>
+        </p:nvSpPr>
+        <p:spPr>
+          <a:xfrm>
+            <a:off x="674627" y="3000786"/>
+            <a:ext cx="945045" cy="338554"/>
+          </a:xfrm>
+          <a:prstGeom prst="rect">
+            <a:avLst/>
+          </a:prstGeom>
+          <a:noFill/>
+        </p:spPr>
+        <p:txBody>
+          <a:bodyPr wrap="square" rtlCol="0">
+            <a:spAutoFit/>
+          </a:bodyPr>
+          <a:lstStyle/>
+          <a:p>
+            <a:r>
+              <a:rPr lang="en-US" sz="1600" dirty="0" smtClean="0"/>
+              <a:t>Stage 6</a:t>
+            </a:r>
+            <a:endParaRPr lang="th-TH" sz="1600" dirty="0"/>
+          </a:p>
+        </p:txBody>
+      </p:sp>
+      <p:sp>
+        <p:nvSpPr>
+          <p:cNvPr id="12" name="TextBox 11"/>
+          <p:cNvSpPr txBox="1"/>
+          <p:nvPr/>
+        </p:nvSpPr>
+        <p:spPr>
+          <a:xfrm>
+            <a:off x="676860" y="4051811"/>
+            <a:ext cx="945045" cy="338554"/>
+          </a:xfrm>
+          <a:prstGeom prst="rect">
+            <a:avLst/>
+          </a:prstGeom>
+          <a:noFill/>
+        </p:spPr>
+        <p:txBody>
+          <a:bodyPr wrap="square" rtlCol="0">
+            <a:spAutoFit/>
+          </a:bodyPr>
+          <a:lstStyle/>
+          <a:p>
+            <a:r>
+              <a:rPr lang="en-US" sz="1600" dirty="0" smtClean="0"/>
+              <a:t>Stage 7</a:t>
+            </a:r>
+            <a:endParaRPr lang="th-TH" sz="1600" dirty="0"/>
+          </a:p>
+        </p:txBody>
+      </p:sp>
+      <p:sp>
+        <p:nvSpPr>
+          <p:cNvPr id="13" name="TextBox 12"/>
+          <p:cNvSpPr txBox="1"/>
+          <p:nvPr/>
+        </p:nvSpPr>
+        <p:spPr>
+          <a:xfrm>
+            <a:off x="676860" y="4946586"/>
+            <a:ext cx="945045" cy="338554"/>
+          </a:xfrm>
+          <a:prstGeom prst="rect">
+            <a:avLst/>
+          </a:prstGeom>
+          <a:noFill/>
+        </p:spPr>
+        <p:txBody>
+          <a:bodyPr wrap="square" rtlCol="0">
+            <a:spAutoFit/>
+          </a:bodyPr>
+          <a:lstStyle/>
+          <a:p>
+            <a:r>
+              <a:rPr lang="en-US" sz="1600" dirty="0" smtClean="0"/>
+              <a:t>Stage 8</a:t>
+            </a:r>
+            <a:endParaRPr lang="th-TH" sz="1600" dirty="0"/>
+          </a:p>
+        </p:txBody>
+      </p:sp>
+      <p:sp>
+        <p:nvSpPr>
+          <p:cNvPr id="14" name="TextBox 13"/>
+          <p:cNvSpPr txBox="1"/>
+          <p:nvPr/>
+        </p:nvSpPr>
+        <p:spPr>
+          <a:xfrm>
+            <a:off x="676860" y="5759188"/>
+            <a:ext cx="945045" cy="338554"/>
+          </a:xfrm>
+          <a:prstGeom prst="rect">
+            <a:avLst/>
+          </a:prstGeom>
+          <a:noFill/>
+        </p:spPr>
+        <p:txBody>
+          <a:bodyPr wrap="square" rtlCol="0">
+            <a:spAutoFit/>
+          </a:bodyPr>
+          <a:lstStyle/>
+          <a:p>
+            <a:r>
+              <a:rPr lang="en-US" sz="1600" dirty="0" smtClean="0"/>
+              <a:t>Stage 9</a:t>
+            </a:r>
+            <a:endParaRPr lang="th-TH" sz="1600" dirty="0"/>
+          </a:p>
+        </p:txBody>
+      </p:sp>
     </p:spTree>
     <p:extLst>
       <p:ext uri="{BB962C8B-B14F-4D97-AF65-F5344CB8AC3E}">
         <p14:creationId xmlns:p14="http://schemas.microsoft.com/office/powerpoint/2010/main" val="1144480073"/>
+      </p:ext>
+    </p:extLst>
+  </p:cSld>
+  <p:clrMapOvr>
+    <a:masterClrMapping/>
+  </p:clrMapOvr>
+</p:sld>
+</file>
+
+<file path=ppt/slides/slide23.xml><?xml version="1.0" encoding="utf-8"?>
+<p:sld xmlns:a="http://schemas.openxmlformats.org/drawingml/2006/main" xmlns:r="http://schemas.openxmlformats.org/officeDocument/2006/relationships" xmlns:p="http://schemas.openxmlformats.org/presentationml/2006/main">
+  <p:cSld>
+    <p:spTree>
+      <p:nvGrpSpPr>
+        <p:cNvPr id="1" name=""/>
+        <p:cNvGrpSpPr/>
+        <p:nvPr/>
+      </p:nvGrpSpPr>
+      <p:grpSpPr>
+        <a:xfrm>
+          <a:off x="0" y="0"/>
+          <a:ext cx="0" cy="0"/>
+          <a:chOff x="0" y="0"/>
+          <a:chExt cx="0" cy="0"/>
+        </a:xfrm>
+      </p:grpSpPr>
+      <p:sp>
+        <p:nvSpPr>
+          <p:cNvPr id="2" name="ชื่อเรื่อง 1"/>
+          <p:cNvSpPr>
+            <a:spLocks noGrp="1"/>
+          </p:cNvSpPr>
+          <p:nvPr>
+            <p:ph type="title"/>
+          </p:nvPr>
+        </p:nvSpPr>
+        <p:spPr/>
+        <p:txBody>
+          <a:bodyPr/>
+          <a:lstStyle/>
+          <a:p>
+            <a:r>
+              <a:rPr lang="en-US" dirty="0" err="1" smtClean="0"/>
+              <a:t>Github</a:t>
+            </a:r>
+            <a:r>
+              <a:rPr lang="en-US" dirty="0" smtClean="0"/>
+              <a:t> Link.</a:t>
+            </a:r>
+            <a:endParaRPr lang="th-TH" dirty="0"/>
+          </a:p>
+        </p:txBody>
+      </p:sp>
+      <p:sp>
+        <p:nvSpPr>
+          <p:cNvPr id="3" name="ตัวแทนเนื้อหา 2"/>
+          <p:cNvSpPr>
+            <a:spLocks noGrp="1"/>
+          </p:cNvSpPr>
+          <p:nvPr>
+            <p:ph idx="1"/>
+          </p:nvPr>
+        </p:nvSpPr>
+        <p:spPr/>
+        <p:txBody>
+          <a:bodyPr/>
+          <a:lstStyle/>
+          <a:p>
+            <a:endParaRPr lang="th-TH"/>
+          </a:p>
+        </p:txBody>
+      </p:sp>
+    </p:spTree>
+    <p:extLst>
+      <p:ext uri="{BB962C8B-B14F-4D97-AF65-F5344CB8AC3E}">
+        <p14:creationId xmlns:p14="http://schemas.microsoft.com/office/powerpoint/2010/main" val="2011083071"/>
       </p:ext>
     </p:extLst>
   </p:cSld>
@@ -4634,6 +6198,66 @@
             <p:ph type="title"/>
           </p:nvPr>
         </p:nvSpPr>
+        <p:spPr>
+          <a:xfrm>
+            <a:off x="395536" y="1988840"/>
+            <a:ext cx="8229600" cy="1143000"/>
+          </a:xfrm>
+        </p:spPr>
+        <p:txBody>
+          <a:bodyPr>
+            <a:normAutofit fontScale="90000"/>
+          </a:bodyPr>
+          <a:lstStyle/>
+          <a:p>
+            <a:r>
+              <a:rPr lang="en-US" dirty="0" smtClean="0"/>
+              <a:t>I am going to demonstrate the output first, to make it clear.</a:t>
+            </a:r>
+            <a:endParaRPr lang="th-TH" dirty="0"/>
+          </a:p>
+        </p:txBody>
+      </p:sp>
+    </p:spTree>
+    <p:extLst>
+      <p:ext uri="{BB962C8B-B14F-4D97-AF65-F5344CB8AC3E}">
+        <p14:creationId xmlns:p14="http://schemas.microsoft.com/office/powerpoint/2010/main" val="2397324876"/>
+      </p:ext>
+    </p:extLst>
+  </p:cSld>
+  <p:clrMapOvr>
+    <a:masterClrMapping/>
+  </p:clrMapOvr>
+</p:sld>
+</file>
+
+<file path=ppt/slides/slide4.xml><?xml version="1.0" encoding="utf-8"?>
+<p:sld xmlns:a="http://schemas.openxmlformats.org/drawingml/2006/main" xmlns:r="http://schemas.openxmlformats.org/officeDocument/2006/relationships" xmlns:p="http://schemas.openxmlformats.org/presentationml/2006/main">
+  <p:cSld>
+    <p:spTree>
+      <p:nvGrpSpPr>
+        <p:cNvPr id="1" name=""/>
+        <p:cNvGrpSpPr/>
+        <p:nvPr/>
+      </p:nvGrpSpPr>
+      <p:grpSpPr>
+        <a:xfrm>
+          <a:off x="0" y="0"/>
+          <a:ext cx="0" cy="0"/>
+          <a:chOff x="0" y="0"/>
+          <a:chExt cx="0" cy="0"/>
+        </a:xfrm>
+      </p:grpSpPr>
+      <p:sp>
+        <p:nvSpPr>
+          <p:cNvPr id="2" name="ชื่อเรื่อง 1"/>
+          <p:cNvSpPr>
+            <a:spLocks noGrp="1"/>
+          </p:cNvSpPr>
+          <p:nvPr>
+            <p:ph type="title"/>
+          </p:nvPr>
+        </p:nvSpPr>
         <p:spPr/>
         <p:txBody>
           <a:bodyPr/>
@@ -4662,7 +6286,32 @@
           <a:bodyPr/>
           <a:lstStyle/>
           <a:p>
-            <a:endParaRPr lang="th-TH"/>
+            <a:r>
+              <a:rPr lang="en-US" dirty="0" smtClean="0"/>
+              <a:t>Command line output for all.</a:t>
+            </a:r>
+          </a:p>
+          <a:p>
+            <a:r>
+              <a:rPr lang="en-US" dirty="0" smtClean="0"/>
+              <a:t>Start at midnight.</a:t>
+            </a:r>
+          </a:p>
+          <a:p>
+            <a:r>
+              <a:rPr lang="en-US" dirty="0" smtClean="0"/>
+              <a:t>Everything started as “off”.</a:t>
+            </a:r>
+          </a:p>
+          <a:p>
+            <a:r>
+              <a:rPr lang="en-US" dirty="0" smtClean="0"/>
+              <a:t>The next stages will progress every 1 hour.</a:t>
+            </a:r>
+            <a:endParaRPr lang="en-US" dirty="0" smtClean="0"/>
+          </a:p>
+          <a:p>
+            <a:endParaRPr lang="th-TH" dirty="0"/>
           </a:p>
         </p:txBody>
       </p:sp>
@@ -4689,7 +6338,7 @@
         </p:blipFill>
         <p:spPr bwMode="auto">
           <a:xfrm>
-            <a:off x="2843808" y="2276872"/>
+            <a:off x="2547376" y="4509120"/>
             <a:ext cx="3581400" cy="1419225"/>
           </a:xfrm>
           <a:prstGeom prst="rect">
@@ -4733,7 +6382,7 @@
 </p:sld>
 </file>
 
-<file path=ppt/slides/slide4.xml><?xml version="1.0" encoding="utf-8"?>
+<file path=ppt/slides/slide5.xml><?xml version="1.0" encoding="utf-8"?>
 <p:sld xmlns:a="http://schemas.openxmlformats.org/drawingml/2006/main" xmlns:r="http://schemas.openxmlformats.org/officeDocument/2006/relationships" xmlns:p="http://schemas.openxmlformats.org/presentationml/2006/main">
   <p:cSld>
     <p:spTree>
@@ -4788,6 +6437,30 @@
           <a:bodyPr/>
           <a:lstStyle/>
           <a:p>
+            <a:r>
+              <a:rPr lang="en-US" dirty="0" smtClean="0"/>
+              <a:t>Execute command to open light in bedroom.</a:t>
+            </a:r>
+          </a:p>
+          <a:p>
+            <a:r>
+              <a:rPr lang="en-US" dirty="0" smtClean="0"/>
+              <a:t>The light turned on immediately</a:t>
+            </a:r>
+          </a:p>
+          <a:p>
+            <a:r>
+              <a:rPr lang="en-US" dirty="0" smtClean="0"/>
+              <a:t>Meanwhile, it is now 1:00 AM, nothing to do with the </a:t>
+            </a:r>
+            <a:r>
+              <a:rPr lang="en-US" dirty="0" smtClean="0"/>
+              <a:t>recent </a:t>
+            </a:r>
+            <a:r>
+              <a:rPr lang="en-US" dirty="0" smtClean="0"/>
+              <a:t>command.</a:t>
+            </a:r>
             <a:endParaRPr lang="th-TH" dirty="0"/>
           </a:p>
         </p:txBody>
@@ -4815,7 +6488,7 @@
         </p:blipFill>
         <p:spPr bwMode="auto">
           <a:xfrm>
-            <a:off x="2557463" y="2204864"/>
+            <a:off x="2464296" y="4077072"/>
             <a:ext cx="4029075" cy="1609725"/>
           </a:xfrm>
           <a:prstGeom prst="rect">
@@ -4859,7 +6532,7 @@
 </p:sld>
 </file>
 
-<file path=ppt/slides/slide5.xml><?xml version="1.0" encoding="utf-8"?>
+<file path=ppt/slides/slide6.xml><?xml version="1.0" encoding="utf-8"?>
 <p:sld xmlns:a="http://schemas.openxmlformats.org/drawingml/2006/main" xmlns:r="http://schemas.openxmlformats.org/officeDocument/2006/relationships" xmlns:p="http://schemas.openxmlformats.org/presentationml/2006/main">
   <p:cSld>
     <p:spTree>
@@ -4914,7 +6587,23 @@
           <a:bodyPr/>
           <a:lstStyle/>
           <a:p>
-            <a:endParaRPr lang="th-TH"/>
+            <a:r>
+              <a:rPr lang="en-US" dirty="0" smtClean="0"/>
+              <a:t>Turn off the bedroom light.</a:t>
+            </a:r>
+          </a:p>
+          <a:p>
+            <a:r>
+              <a:rPr lang="en-US" dirty="0" smtClean="0"/>
+              <a:t>Turn on the kitchen light.</a:t>
+            </a:r>
+          </a:p>
+          <a:p>
+            <a:r>
+              <a:rPr lang="en-US" dirty="0" smtClean="0"/>
+              <a:t>Now 2:00 AM.</a:t>
+            </a:r>
+            <a:endParaRPr lang="th-TH" dirty="0"/>
           </a:p>
         </p:txBody>
       </p:sp>
@@ -4941,7 +6630,7 @@
         </p:blipFill>
         <p:spPr bwMode="auto">
           <a:xfrm>
-            <a:off x="1352550" y="2276872"/>
+            <a:off x="1343325" y="3789040"/>
             <a:ext cx="6438900" cy="1962150"/>
           </a:xfrm>
           <a:prstGeom prst="rect">
@@ -4985,7 +6674,7 @@
 </p:sld>
 </file>
 
-<file path=ppt/slides/slide6.xml><?xml version="1.0" encoding="utf-8"?>
+<file path=ppt/slides/slide7.xml><?xml version="1.0" encoding="utf-8"?>
 <p:sld xmlns:a="http://schemas.openxmlformats.org/drawingml/2006/main" xmlns:r="http://schemas.openxmlformats.org/officeDocument/2006/relationships" xmlns:p="http://schemas.openxmlformats.org/presentationml/2006/main">
   <p:cSld>
     <p:spTree>
@@ -5040,7 +6729,17 @@
           <a:bodyPr/>
           <a:lstStyle/>
           <a:p>
-            <a:endParaRPr lang="th-TH"/>
+            <a:r>
+              <a:rPr lang="en-US" dirty="0" smtClean="0"/>
+              <a:t>Invalid commands demonstration.</a:t>
+            </a:r>
+          </a:p>
+          <a:p>
+            <a:r>
+              <a:rPr lang="en-US" dirty="0" smtClean="0"/>
+              <a:t>Now 3:00 AM.</a:t>
+            </a:r>
+            <a:endParaRPr lang="th-TH" dirty="0"/>
           </a:p>
         </p:txBody>
       </p:sp>
@@ -5067,8 +6766,8 @@
         </p:blipFill>
         <p:spPr bwMode="auto">
           <a:xfrm>
-            <a:off x="1590675" y="1844824"/>
-            <a:ext cx="5962650" cy="3562350"/>
+            <a:off x="1691680" y="2996952"/>
+            <a:ext cx="5746626" cy="3433288"/>
           </a:xfrm>
           <a:prstGeom prst="rect">
             <a:avLst/>
@@ -5111,7 +6810,7 @@
 </p:sld>
 </file>
 
-<file path=ppt/slides/slide7.xml><?xml version="1.0" encoding="utf-8"?>
+<file path=ppt/slides/slide8.xml><?xml version="1.0" encoding="utf-8"?>
 <p:sld xmlns:a="http://schemas.openxmlformats.org/drawingml/2006/main" xmlns:r="http://schemas.openxmlformats.org/officeDocument/2006/relationships" xmlns:p="http://schemas.openxmlformats.org/presentationml/2006/main">
   <p:cSld>
     <p:spTree>
@@ -5166,7 +6865,17 @@
           <a:bodyPr/>
           <a:lstStyle/>
           <a:p>
-            <a:endParaRPr lang="th-TH"/>
+            <a:r>
+              <a:rPr lang="en-US" dirty="0" smtClean="0"/>
+              <a:t>2 scheduling commands executed, one is turn on the bedroom light at 6:00 AM, another for bathroom light at 7:00 AM.</a:t>
+            </a:r>
+          </a:p>
+          <a:p>
+            <a:r>
+              <a:rPr lang="en-US" dirty="0" smtClean="0"/>
+              <a:t>Now 4:00 AM, nothing physically changed yet.</a:t>
+            </a:r>
+            <a:endParaRPr lang="th-TH" dirty="0"/>
           </a:p>
         </p:txBody>
       </p:sp>
@@ -5193,7 +6902,7 @@
         </p:blipFill>
         <p:spPr bwMode="auto">
           <a:xfrm>
-            <a:off x="866775" y="2204864"/>
+            <a:off x="683568" y="4005064"/>
             <a:ext cx="7410450" cy="2009775"/>
           </a:xfrm>
           <a:prstGeom prst="rect">
@@ -5237,7 +6946,7 @@
 </p:sld>
 </file>
 
-<file path=ppt/slides/slide8.xml><?xml version="1.0" encoding="utf-8"?>
+<file path=ppt/slides/slide9.xml><?xml version="1.0" encoding="utf-8"?>
 <p:sld xmlns:a="http://schemas.openxmlformats.org/drawingml/2006/main" xmlns:r="http://schemas.openxmlformats.org/officeDocument/2006/relationships" xmlns:p="http://schemas.openxmlformats.org/presentationml/2006/main">
   <p:cSld>
     <p:spTree>
@@ -5292,7 +7001,52 @@
           <a:bodyPr/>
           <a:lstStyle/>
           <a:p>
-            <a:endParaRPr lang="th-TH"/>
+            <a:r>
+              <a:rPr lang="en-US" dirty="0"/>
+              <a:t>2 scheduling commands executed, one is turn on the </a:t>
+            </a:r>
+            <a:r>
+              <a:rPr lang="en-US" dirty="0" smtClean="0"/>
+              <a:t>bathroom water at 7:00 </a:t>
+            </a:r>
+            <a:r>
+              <a:rPr lang="en-US" dirty="0"/>
+              <a:t>AM, another for </a:t>
+            </a:r>
+            <a:r>
+              <a:rPr lang="en-US" dirty="0" smtClean="0"/>
+              <a:t>kitchen water </a:t>
+            </a:r>
+            <a:r>
+              <a:rPr lang="en-US" dirty="0"/>
+              <a:t>at </a:t>
+            </a:r>
+            <a:r>
+              <a:rPr lang="en-US" dirty="0" smtClean="0"/>
+              <a:t>8:00 </a:t>
+            </a:r>
+            <a:r>
+              <a:rPr lang="en-US" dirty="0"/>
+              <a:t>AM.</a:t>
+            </a:r>
+          </a:p>
+          <a:p>
+            <a:r>
+              <a:rPr lang="en-US" dirty="0"/>
+              <a:t>Now </a:t>
+            </a:r>
+            <a:r>
+              <a:rPr lang="en-US" dirty="0" smtClean="0"/>
+              <a:t>5:00 </a:t>
+            </a:r>
+            <a:r>
+              <a:rPr lang="en-US" dirty="0"/>
+              <a:t>AM, nothing physically changed yet.</a:t>
+            </a:r>
+            <a:endParaRPr lang="th-TH" dirty="0"/>
+          </a:p>
+          <a:p>
+            <a:endParaRPr lang="th-TH" dirty="0"/>
           </a:p>
         </p:txBody>
       </p:sp>
@@ -5319,7 +7073,7 @@
         </p:blipFill>
         <p:spPr bwMode="auto">
           <a:xfrm>
-            <a:off x="871537" y="2204864"/>
+            <a:off x="858379" y="4005064"/>
             <a:ext cx="7400925" cy="2019300"/>
           </a:xfrm>
           <a:prstGeom prst="rect">
@@ -5354,132 +7108,6 @@
     <p:extLst>
       <p:ext uri="{BB962C8B-B14F-4D97-AF65-F5344CB8AC3E}">
         <p14:creationId xmlns:p14="http://schemas.microsoft.com/office/powerpoint/2010/main" val="1512187736"/>
-      </p:ext>
-    </p:extLst>
-  </p:cSld>
-  <p:clrMapOvr>
-    <a:masterClrMapping/>
-  </p:clrMapOvr>
-</p:sld>
-</file>
-
-<file path=ppt/slides/slide9.xml><?xml version="1.0" encoding="utf-8"?>
-<p:sld xmlns:a="http://schemas.openxmlformats.org/drawingml/2006/main" xmlns:r="http://schemas.openxmlformats.org/officeDocument/2006/relationships" xmlns:p="http://schemas.openxmlformats.org/presentationml/2006/main">
-  <p:cSld>
-    <p:spTree>
-      <p:nvGrpSpPr>
-        <p:cNvPr id="1" name=""/>
-        <p:cNvGrpSpPr/>
-        <p:nvPr/>
-      </p:nvGrpSpPr>
-      <p:grpSpPr>
-        <a:xfrm>
-          <a:off x="0" y="0"/>
-          <a:ext cx="0" cy="0"/>
-          <a:chOff x="0" y="0"/>
-          <a:chExt cx="0" cy="0"/>
-        </a:xfrm>
-      </p:grpSpPr>
-      <p:sp>
-        <p:nvSpPr>
-          <p:cNvPr id="2" name="ชื่อเรื่อง 1"/>
-          <p:cNvSpPr>
-            <a:spLocks noGrp="1"/>
-          </p:cNvSpPr>
-          <p:nvPr>
-            <p:ph type="title"/>
-          </p:nvPr>
-        </p:nvSpPr>
-        <p:spPr/>
-        <p:txBody>
-          <a:bodyPr/>
-          <a:lstStyle/>
-          <a:p>
-            <a:r>
-              <a:rPr lang="en-US" dirty="0" smtClean="0"/>
-              <a:t>Stage 7</a:t>
-            </a:r>
-            <a:endParaRPr lang="th-TH" dirty="0"/>
-          </a:p>
-        </p:txBody>
-      </p:sp>
-      <p:sp>
-        <p:nvSpPr>
-          <p:cNvPr id="3" name="ตัวแทนเนื้อหา 2"/>
-          <p:cNvSpPr>
-            <a:spLocks noGrp="1"/>
-          </p:cNvSpPr>
-          <p:nvPr>
-            <p:ph idx="1"/>
-          </p:nvPr>
-        </p:nvSpPr>
-        <p:spPr/>
-        <p:txBody>
-          <a:bodyPr/>
-          <a:lstStyle/>
-          <a:p>
-            <a:endParaRPr lang="th-TH"/>
-          </a:p>
-        </p:txBody>
-      </p:sp>
-      <p:pic>
-        <p:nvPicPr>
-          <p:cNvPr id="7170" name="Picture 2"/>
-          <p:cNvPicPr>
-            <a:picLocks noChangeAspect="1" noChangeArrowheads="1"/>
-          </p:cNvPicPr>
-          <p:nvPr/>
-        </p:nvPicPr>
-        <p:blipFill>
-          <a:blip r:embed="rId2">
-            <a:extLst>
-              <a:ext uri="{28A0092B-C50C-407E-A947-70E740481C1C}">
-                <a14:useLocalDpi xmlns:a14="http://schemas.microsoft.com/office/drawing/2010/main" val="0"/>
-              </a:ext>
-            </a:extLst>
-          </a:blip>
-          <a:srcRect/>
-          <a:stretch>
-            <a:fillRect/>
-          </a:stretch>
-        </p:blipFill>
-        <p:spPr bwMode="auto">
-          <a:xfrm>
-            <a:off x="899592" y="2276872"/>
-            <a:ext cx="7172325" cy="1809750"/>
-          </a:xfrm>
-          <a:prstGeom prst="rect">
-            <a:avLst/>
-          </a:prstGeom>
-          <a:noFill/>
-          <a:ln>
-            <a:noFill/>
-          </a:ln>
-          <a:extLst>
-            <a:ext uri="{909E8E84-426E-40DD-AFC4-6F175D3DCCD1}">
-              <a14:hiddenFill xmlns:a14="http://schemas.microsoft.com/office/drawing/2010/main">
-                <a:solidFill>
-                  <a:schemeClr val="accent1"/>
-                </a:solidFill>
-              </a14:hiddenFill>
-            </a:ext>
-            <a:ext uri="{91240B29-F687-4F45-9708-019B960494DF}">
-              <a14:hiddenLine xmlns:a14="http://schemas.microsoft.com/office/drawing/2010/main" w="9525">
-                <a:solidFill>
-                  <a:schemeClr val="tx1"/>
-                </a:solidFill>
-                <a:miter lim="800000"/>
-                <a:headEnd/>
-                <a:tailEnd/>
-              </a14:hiddenLine>
-            </a:ext>
-          </a:extLst>
-        </p:spPr>
-      </p:pic>
-    </p:spTree>
-    <p:extLst>
-      <p:ext uri="{BB962C8B-B14F-4D97-AF65-F5344CB8AC3E}">
-        <p14:creationId xmlns:p14="http://schemas.microsoft.com/office/powerpoint/2010/main" val="741119570"/>
       </p:ext>
     </p:extLst>
   </p:cSld>

</xml_diff>

<commit_message>
Renamed the file, and removed the unused one.
</commit_message>
<xml_diff>
--- a/project_presentation.pptx
+++ b/project_presentation.pptx
@@ -310,7 +310,7 @@
           <a:p>
             <a:fld id="{3F5F293D-20BF-487A-BFA7-792ABC73B8A5}" type="datetimeFigureOut">
               <a:rPr lang="th-TH" smtClean="0"/>
-              <a:t>26/12/63</a:t>
+              <a:t>27/12/63</a:t>
             </a:fld>
             <a:endParaRPr lang="th-TH"/>
           </a:p>
@@ -475,7 +475,7 @@
           <a:p>
             <a:fld id="{3F5F293D-20BF-487A-BFA7-792ABC73B8A5}" type="datetimeFigureOut">
               <a:rPr lang="th-TH" smtClean="0"/>
-              <a:t>26/12/63</a:t>
+              <a:t>27/12/63</a:t>
             </a:fld>
             <a:endParaRPr lang="th-TH"/>
           </a:p>
@@ -650,7 +650,7 @@
           <a:p>
             <a:fld id="{3F5F293D-20BF-487A-BFA7-792ABC73B8A5}" type="datetimeFigureOut">
               <a:rPr lang="th-TH" smtClean="0"/>
-              <a:t>26/12/63</a:t>
+              <a:t>27/12/63</a:t>
             </a:fld>
             <a:endParaRPr lang="th-TH"/>
           </a:p>
@@ -815,7 +815,7 @@
           <a:p>
             <a:fld id="{3F5F293D-20BF-487A-BFA7-792ABC73B8A5}" type="datetimeFigureOut">
               <a:rPr lang="th-TH" smtClean="0"/>
-              <a:t>26/12/63</a:t>
+              <a:t>27/12/63</a:t>
             </a:fld>
             <a:endParaRPr lang="th-TH"/>
           </a:p>
@@ -1056,7 +1056,7 @@
           <a:p>
             <a:fld id="{3F5F293D-20BF-487A-BFA7-792ABC73B8A5}" type="datetimeFigureOut">
               <a:rPr lang="th-TH" smtClean="0"/>
-              <a:t>26/12/63</a:t>
+              <a:t>27/12/63</a:t>
             </a:fld>
             <a:endParaRPr lang="th-TH"/>
           </a:p>
@@ -1339,7 +1339,7 @@
           <a:p>
             <a:fld id="{3F5F293D-20BF-487A-BFA7-792ABC73B8A5}" type="datetimeFigureOut">
               <a:rPr lang="th-TH" smtClean="0"/>
-              <a:t>26/12/63</a:t>
+              <a:t>27/12/63</a:t>
             </a:fld>
             <a:endParaRPr lang="th-TH"/>
           </a:p>
@@ -1756,7 +1756,7 @@
           <a:p>
             <a:fld id="{3F5F293D-20BF-487A-BFA7-792ABC73B8A5}" type="datetimeFigureOut">
               <a:rPr lang="th-TH" smtClean="0"/>
-              <a:t>26/12/63</a:t>
+              <a:t>27/12/63</a:t>
             </a:fld>
             <a:endParaRPr lang="th-TH"/>
           </a:p>
@@ -1869,7 +1869,7 @@
           <a:p>
             <a:fld id="{3F5F293D-20BF-487A-BFA7-792ABC73B8A5}" type="datetimeFigureOut">
               <a:rPr lang="th-TH" smtClean="0"/>
-              <a:t>26/12/63</a:t>
+              <a:t>27/12/63</a:t>
             </a:fld>
             <a:endParaRPr lang="th-TH"/>
           </a:p>
@@ -1959,7 +1959,7 @@
           <a:p>
             <a:fld id="{3F5F293D-20BF-487A-BFA7-792ABC73B8A5}" type="datetimeFigureOut">
               <a:rPr lang="th-TH" smtClean="0"/>
-              <a:t>26/12/63</a:t>
+              <a:t>27/12/63</a:t>
             </a:fld>
             <a:endParaRPr lang="th-TH"/>
           </a:p>
@@ -2231,7 +2231,7 @@
           <a:p>
             <a:fld id="{3F5F293D-20BF-487A-BFA7-792ABC73B8A5}" type="datetimeFigureOut">
               <a:rPr lang="th-TH" smtClean="0"/>
-              <a:t>26/12/63</a:t>
+              <a:t>27/12/63</a:t>
             </a:fld>
             <a:endParaRPr lang="th-TH"/>
           </a:p>
@@ -2479,7 +2479,7 @@
           <a:p>
             <a:fld id="{3F5F293D-20BF-487A-BFA7-792ABC73B8A5}" type="datetimeFigureOut">
               <a:rPr lang="th-TH" smtClean="0"/>
-              <a:t>26/12/63</a:t>
+              <a:t>27/12/63</a:t>
             </a:fld>
             <a:endParaRPr lang="th-TH"/>
           </a:p>
@@ -2687,7 +2687,7 @@
           <a:p>
             <a:fld id="{3F5F293D-20BF-487A-BFA7-792ABC73B8A5}" type="datetimeFigureOut">
               <a:rPr lang="th-TH" smtClean="0"/>
-              <a:t>26/12/63</a:t>
+              <a:t>27/12/63</a:t>
             </a:fld>
             <a:endParaRPr lang="th-TH"/>
           </a:p>
@@ -5402,11 +5402,7 @@
           <a:p>
             <a:r>
               <a:rPr lang="en-US" sz="1600" dirty="0" smtClean="0"/>
-              <a:t>Always check for schedu</a:t>
-            </a:r>
-            <a:r>
-              <a:rPr lang="en-US" sz="1600" dirty="0" smtClean="0"/>
-              <a:t>led event just in case, if found, trigger it.</a:t>
+              <a:t>Always check for scheduled event just in case, if found, trigger it.</a:t>
             </a:r>
             <a:endParaRPr lang="th-TH" sz="1600" dirty="0"/>
           </a:p>
@@ -7410,6 +7406,23 @@
             <a:endParaRPr lang="en-US" sz="2800" dirty="0" smtClean="0"/>
           </a:p>
           <a:p>
+            <a:endParaRPr lang="en-US" dirty="0" smtClean="0"/>
+          </a:p>
+          <a:p>
+            <a:r>
+              <a:rPr lang="en-US" dirty="0" smtClean="0"/>
+              <a:t>(File : </a:t>
+            </a:r>
+            <a:r>
+              <a:rPr lang="en-US" dirty="0" smtClean="0">
+                <a:hlinkClick r:id="rId3" tooltip="extened_test_command.py"/>
+              </a:rPr>
+              <a:t>smart_home_command.py</a:t>
+            </a:r>
+            <a:r>
+              <a:rPr lang="en-US" dirty="0" smtClean="0"/>
+              <a:t>)</a:t>
+            </a:r>
             <a:endParaRPr lang="th-TH" dirty="0"/>
           </a:p>
         </p:txBody>

</xml_diff>